<commit_message>
Adding first draft for Appendix A
</commit_message>
<xml_diff>
--- a/images/000_edit_images.pptx
+++ b/images/000_edit_images.pptx
@@ -9,6 +9,10 @@
     <p:sldId id="257" r:id="rId3"/>
     <p:sldId id="258" r:id="rId4"/>
     <p:sldId id="259" r:id="rId5"/>
+    <p:sldId id="260" r:id="rId6"/>
+    <p:sldId id="261" r:id="rId7"/>
+    <p:sldId id="263" r:id="rId8"/>
+    <p:sldId id="264" r:id="rId9"/>
   </p:sldIdLst>
   <p:sldSz cx="12192000" cy="6858000"/>
   <p:notesSz cx="6858000" cy="9144000"/>
@@ -262,7 +266,7 @@
           <a:p>
             <a:fld id="{55C57227-F9A5-4AB4-8A09-D6AFBCD7EA65}" type="datetimeFigureOut">
               <a:rPr lang="en-US" smtClean="0"/>
-              <a:t>2024-04-13</a:t>
+              <a:t>2024-04-27</a:t>
             </a:fld>
             <a:endParaRPr lang="en-US"/>
           </a:p>
@@ -460,7 +464,7 @@
           <a:p>
             <a:fld id="{55C57227-F9A5-4AB4-8A09-D6AFBCD7EA65}" type="datetimeFigureOut">
               <a:rPr lang="en-US" smtClean="0"/>
-              <a:t>2024-04-13</a:t>
+              <a:t>2024-04-27</a:t>
             </a:fld>
             <a:endParaRPr lang="en-US"/>
           </a:p>
@@ -668,7 +672,7 @@
           <a:p>
             <a:fld id="{55C57227-F9A5-4AB4-8A09-D6AFBCD7EA65}" type="datetimeFigureOut">
               <a:rPr lang="en-US" smtClean="0"/>
-              <a:t>2024-04-13</a:t>
+              <a:t>2024-04-27</a:t>
             </a:fld>
             <a:endParaRPr lang="en-US"/>
           </a:p>
@@ -866,7 +870,7 @@
           <a:p>
             <a:fld id="{55C57227-F9A5-4AB4-8A09-D6AFBCD7EA65}" type="datetimeFigureOut">
               <a:rPr lang="en-US" smtClean="0"/>
-              <a:t>2024-04-13</a:t>
+              <a:t>2024-04-27</a:t>
             </a:fld>
             <a:endParaRPr lang="en-US"/>
           </a:p>
@@ -1141,7 +1145,7 @@
           <a:p>
             <a:fld id="{55C57227-F9A5-4AB4-8A09-D6AFBCD7EA65}" type="datetimeFigureOut">
               <a:rPr lang="en-US" smtClean="0"/>
-              <a:t>2024-04-13</a:t>
+              <a:t>2024-04-27</a:t>
             </a:fld>
             <a:endParaRPr lang="en-US"/>
           </a:p>
@@ -1406,7 +1410,7 @@
           <a:p>
             <a:fld id="{55C57227-F9A5-4AB4-8A09-D6AFBCD7EA65}" type="datetimeFigureOut">
               <a:rPr lang="en-US" smtClean="0"/>
-              <a:t>2024-04-13</a:t>
+              <a:t>2024-04-27</a:t>
             </a:fld>
             <a:endParaRPr lang="en-US"/>
           </a:p>
@@ -1818,7 +1822,7 @@
           <a:p>
             <a:fld id="{55C57227-F9A5-4AB4-8A09-D6AFBCD7EA65}" type="datetimeFigureOut">
               <a:rPr lang="en-US" smtClean="0"/>
-              <a:t>2024-04-13</a:t>
+              <a:t>2024-04-27</a:t>
             </a:fld>
             <a:endParaRPr lang="en-US"/>
           </a:p>
@@ -1959,7 +1963,7 @@
           <a:p>
             <a:fld id="{55C57227-F9A5-4AB4-8A09-D6AFBCD7EA65}" type="datetimeFigureOut">
               <a:rPr lang="en-US" smtClean="0"/>
-              <a:t>2024-04-13</a:t>
+              <a:t>2024-04-27</a:t>
             </a:fld>
             <a:endParaRPr lang="en-US"/>
           </a:p>
@@ -2072,7 +2076,7 @@
           <a:p>
             <a:fld id="{55C57227-F9A5-4AB4-8A09-D6AFBCD7EA65}" type="datetimeFigureOut">
               <a:rPr lang="en-US" smtClean="0"/>
-              <a:t>2024-04-13</a:t>
+              <a:t>2024-04-27</a:t>
             </a:fld>
             <a:endParaRPr lang="en-US"/>
           </a:p>
@@ -2383,7 +2387,7 @@
           <a:p>
             <a:fld id="{55C57227-F9A5-4AB4-8A09-D6AFBCD7EA65}" type="datetimeFigureOut">
               <a:rPr lang="en-US" smtClean="0"/>
-              <a:t>2024-04-13</a:t>
+              <a:t>2024-04-27</a:t>
             </a:fld>
             <a:endParaRPr lang="en-US"/>
           </a:p>
@@ -2671,7 +2675,7 @@
           <a:p>
             <a:fld id="{55C57227-F9A5-4AB4-8A09-D6AFBCD7EA65}" type="datetimeFigureOut">
               <a:rPr lang="en-US" smtClean="0"/>
-              <a:t>2024-04-13</a:t>
+              <a:t>2024-04-27</a:t>
             </a:fld>
             <a:endParaRPr lang="en-US"/>
           </a:p>
@@ -2912,7 +2916,7 @@
           <a:p>
             <a:fld id="{55C57227-F9A5-4AB4-8A09-D6AFBCD7EA65}" type="datetimeFigureOut">
               <a:rPr lang="en-US" smtClean="0"/>
-              <a:t>2024-04-13</a:t>
+              <a:t>2024-04-27</a:t>
             </a:fld>
             <a:endParaRPr lang="en-US"/>
           </a:p>
@@ -5170,6 +5174,1124 @@
 </p:sld>
 </file>
 
+<file path=ppt/slides/slide5.xml><?xml version="1.0" encoding="utf-8"?>
+<p:sld xmlns:a="http://schemas.openxmlformats.org/drawingml/2006/main" xmlns:r="http://schemas.openxmlformats.org/officeDocument/2006/relationships" xmlns:p="http://schemas.openxmlformats.org/presentationml/2006/main">
+  <p:cSld>
+    <p:spTree>
+      <p:nvGrpSpPr>
+        <p:cNvPr id="1" name=""/>
+        <p:cNvGrpSpPr/>
+        <p:nvPr/>
+      </p:nvGrpSpPr>
+      <p:grpSpPr>
+        <a:xfrm>
+          <a:off x="0" y="0"/>
+          <a:ext cx="0" cy="0"/>
+          <a:chOff x="0" y="0"/>
+          <a:chExt cx="0" cy="0"/>
+        </a:xfrm>
+      </p:grpSpPr>
+      <p:grpSp>
+        <p:nvGrpSpPr>
+          <p:cNvPr id="2" name="Group 1">
+            <a:extLst>
+              <a:ext uri="{FF2B5EF4-FFF2-40B4-BE49-F238E27FC236}">
+                <a16:creationId xmlns:a16="http://schemas.microsoft.com/office/drawing/2014/main" id="{01883DA4-DD59-3BCA-CEC0-23015F12C36A}"/>
+              </a:ext>
+            </a:extLst>
+          </p:cNvPr>
+          <p:cNvGrpSpPr/>
+          <p:nvPr/>
+        </p:nvGrpSpPr>
+        <p:grpSpPr>
+          <a:xfrm>
+            <a:off x="0" y="178789"/>
+            <a:ext cx="12192000" cy="6500422"/>
+            <a:chOff x="0" y="178789"/>
+            <a:chExt cx="12192000" cy="6500422"/>
+          </a:xfrm>
+        </p:grpSpPr>
+        <p:pic>
+          <p:nvPicPr>
+            <p:cNvPr id="8" name="Picture 7" descr="A screenshot of a computer&#10;&#10;Description automatically generated">
+              <a:extLst>
+                <a:ext uri="{FF2B5EF4-FFF2-40B4-BE49-F238E27FC236}">
+                  <a16:creationId xmlns:a16="http://schemas.microsoft.com/office/drawing/2014/main" id="{23D34732-39AE-FE11-5B5B-ABCC044A7051}"/>
+                </a:ext>
+              </a:extLst>
+            </p:cNvPr>
+            <p:cNvPicPr>
+              <a:picLocks noChangeAspect="1"/>
+            </p:cNvPicPr>
+            <p:nvPr/>
+          </p:nvPicPr>
+          <p:blipFill>
+            <a:blip r:embed="rId2">
+              <a:extLst>
+                <a:ext uri="{28A0092B-C50C-407E-A947-70E740481C1C}">
+                  <a14:useLocalDpi xmlns:a14="http://schemas.microsoft.com/office/drawing/2010/main" val="0"/>
+                </a:ext>
+              </a:extLst>
+            </a:blip>
+            <a:stretch>
+              <a:fillRect/>
+            </a:stretch>
+          </p:blipFill>
+          <p:spPr>
+            <a:xfrm>
+              <a:off x="0" y="178789"/>
+              <a:ext cx="12192000" cy="6500422"/>
+            </a:xfrm>
+            <a:prstGeom prst="rect">
+              <a:avLst/>
+            </a:prstGeom>
+          </p:spPr>
+        </p:pic>
+        <p:cxnSp>
+          <p:nvCxnSpPr>
+            <p:cNvPr id="19" name="Straight Arrow Connector 18">
+              <a:extLst>
+                <a:ext uri="{FF2B5EF4-FFF2-40B4-BE49-F238E27FC236}">
+                  <a16:creationId xmlns:a16="http://schemas.microsoft.com/office/drawing/2014/main" id="{CEE8F12A-BEDA-8D6A-1B7D-2FA944C0C905}"/>
+                </a:ext>
+              </a:extLst>
+            </p:cNvPr>
+            <p:cNvCxnSpPr/>
+            <p:nvPr/>
+          </p:nvCxnSpPr>
+          <p:spPr>
+            <a:xfrm flipH="1">
+              <a:off x="2168271" y="6329172"/>
+              <a:ext cx="314325" cy="0"/>
+            </a:xfrm>
+            <a:prstGeom prst="straightConnector1">
+              <a:avLst/>
+            </a:prstGeom>
+            <a:ln w="38100">
+              <a:solidFill>
+                <a:schemeClr val="accent6"/>
+              </a:solidFill>
+              <a:tailEnd type="triangle"/>
+            </a:ln>
+          </p:spPr>
+          <p:style>
+            <a:lnRef idx="2">
+              <a:schemeClr val="accent1"/>
+            </a:lnRef>
+            <a:fillRef idx="0">
+              <a:schemeClr val="accent1"/>
+            </a:fillRef>
+            <a:effectRef idx="1">
+              <a:schemeClr val="accent1"/>
+            </a:effectRef>
+            <a:fontRef idx="minor">
+              <a:schemeClr val="tx1"/>
+            </a:fontRef>
+          </p:style>
+        </p:cxnSp>
+        <p:sp>
+          <p:nvSpPr>
+            <p:cNvPr id="21" name="Rectangle 20">
+              <a:extLst>
+                <a:ext uri="{FF2B5EF4-FFF2-40B4-BE49-F238E27FC236}">
+                  <a16:creationId xmlns:a16="http://schemas.microsoft.com/office/drawing/2014/main" id="{59B0BCF1-D26D-1F19-4243-9DE25A888D3F}"/>
+                </a:ext>
+              </a:extLst>
+            </p:cNvPr>
+            <p:cNvSpPr/>
+            <p:nvPr/>
+          </p:nvSpPr>
+          <p:spPr>
+            <a:xfrm>
+              <a:off x="232960" y="6190489"/>
+              <a:ext cx="1733000" cy="233336"/>
+            </a:xfrm>
+            <a:prstGeom prst="rect">
+              <a:avLst/>
+            </a:prstGeom>
+            <a:noFill/>
+            <a:ln w="38100">
+              <a:solidFill>
+                <a:schemeClr val="accent6"/>
+              </a:solidFill>
+            </a:ln>
+          </p:spPr>
+          <p:style>
+            <a:lnRef idx="2">
+              <a:schemeClr val="accent1">
+                <a:shade val="15000"/>
+              </a:schemeClr>
+            </a:lnRef>
+            <a:fillRef idx="1">
+              <a:schemeClr val="accent1"/>
+            </a:fillRef>
+            <a:effectRef idx="0">
+              <a:schemeClr val="accent1"/>
+            </a:effectRef>
+            <a:fontRef idx="minor">
+              <a:schemeClr val="lt1"/>
+            </a:fontRef>
+          </p:style>
+          <p:txBody>
+            <a:bodyPr rtlCol="0" anchor="ctr"/>
+            <a:lstStyle/>
+            <a:p>
+              <a:pPr algn="ctr"/>
+              <a:endParaRPr lang="en-US"/>
+            </a:p>
+          </p:txBody>
+        </p:sp>
+      </p:grpSp>
+    </p:spTree>
+    <p:extLst>
+      <p:ext uri="{BB962C8B-B14F-4D97-AF65-F5344CB8AC3E}">
+        <p14:creationId xmlns:p14="http://schemas.microsoft.com/office/powerpoint/2010/main" val="666996300"/>
+      </p:ext>
+    </p:extLst>
+  </p:cSld>
+  <p:clrMapOvr>
+    <a:masterClrMapping/>
+  </p:clrMapOvr>
+</p:sld>
+</file>
+
+<file path=ppt/slides/slide6.xml><?xml version="1.0" encoding="utf-8"?>
+<p:sld xmlns:a="http://schemas.openxmlformats.org/drawingml/2006/main" xmlns:r="http://schemas.openxmlformats.org/officeDocument/2006/relationships" xmlns:p="http://schemas.openxmlformats.org/presentationml/2006/main">
+  <p:cSld>
+    <p:bg>
+      <p:bgPr>
+        <a:solidFill>
+          <a:schemeClr val="bg1"/>
+        </a:solidFill>
+        <a:effectLst/>
+      </p:bgPr>
+    </p:bg>
+    <p:spTree>
+      <p:nvGrpSpPr>
+        <p:cNvPr id="1" name=""/>
+        <p:cNvGrpSpPr/>
+        <p:nvPr/>
+      </p:nvGrpSpPr>
+      <p:grpSpPr>
+        <a:xfrm>
+          <a:off x="0" y="0"/>
+          <a:ext cx="0" cy="0"/>
+          <a:chOff x="0" y="0"/>
+          <a:chExt cx="0" cy="0"/>
+        </a:xfrm>
+      </p:grpSpPr>
+      <p:grpSp>
+        <p:nvGrpSpPr>
+          <p:cNvPr id="14" name="Group 13">
+            <a:extLst>
+              <a:ext uri="{FF2B5EF4-FFF2-40B4-BE49-F238E27FC236}">
+                <a16:creationId xmlns:a16="http://schemas.microsoft.com/office/drawing/2014/main" id="{B6F2A7EE-4DF5-FFE6-65CE-E483FC1E1AD5}"/>
+              </a:ext>
+            </a:extLst>
+          </p:cNvPr>
+          <p:cNvGrpSpPr/>
+          <p:nvPr/>
+        </p:nvGrpSpPr>
+        <p:grpSpPr>
+          <a:xfrm>
+            <a:off x="0" y="187947"/>
+            <a:ext cx="12192000" cy="6482105"/>
+            <a:chOff x="0" y="187947"/>
+            <a:chExt cx="12192000" cy="6482105"/>
+          </a:xfrm>
+        </p:grpSpPr>
+        <p:pic>
+          <p:nvPicPr>
+            <p:cNvPr id="10" name="Picture 9" descr="A screenshot of a computer&#10;&#10;Description automatically generated">
+              <a:extLst>
+                <a:ext uri="{FF2B5EF4-FFF2-40B4-BE49-F238E27FC236}">
+                  <a16:creationId xmlns:a16="http://schemas.microsoft.com/office/drawing/2014/main" id="{0992E750-44C8-9B6F-F81F-954A69D85C57}"/>
+                </a:ext>
+              </a:extLst>
+            </p:cNvPr>
+            <p:cNvPicPr>
+              <a:picLocks noChangeAspect="1"/>
+            </p:cNvPicPr>
+            <p:nvPr/>
+          </p:nvPicPr>
+          <p:blipFill>
+            <a:blip r:embed="rId2">
+              <a:extLst>
+                <a:ext uri="{28A0092B-C50C-407E-A947-70E740481C1C}">
+                  <a14:useLocalDpi xmlns:a14="http://schemas.microsoft.com/office/drawing/2010/main" val="0"/>
+                </a:ext>
+              </a:extLst>
+            </a:blip>
+            <a:stretch>
+              <a:fillRect/>
+            </a:stretch>
+          </p:blipFill>
+          <p:spPr>
+            <a:xfrm>
+              <a:off x="0" y="187947"/>
+              <a:ext cx="12192000" cy="6482105"/>
+            </a:xfrm>
+            <a:prstGeom prst="rect">
+              <a:avLst/>
+            </a:prstGeom>
+          </p:spPr>
+        </p:pic>
+        <p:sp>
+          <p:nvSpPr>
+            <p:cNvPr id="11" name="Rectangle 10">
+              <a:extLst>
+                <a:ext uri="{FF2B5EF4-FFF2-40B4-BE49-F238E27FC236}">
+                  <a16:creationId xmlns:a16="http://schemas.microsoft.com/office/drawing/2014/main" id="{FBBF7055-BD77-2AB9-E8C0-9FC4AB52DBC8}"/>
+                </a:ext>
+              </a:extLst>
+            </p:cNvPr>
+            <p:cNvSpPr/>
+            <p:nvPr/>
+          </p:nvSpPr>
+          <p:spPr>
+            <a:xfrm>
+              <a:off x="6638924" y="786384"/>
+              <a:ext cx="5486401" cy="1890141"/>
+            </a:xfrm>
+            <a:prstGeom prst="rect">
+              <a:avLst/>
+            </a:prstGeom>
+            <a:noFill/>
+            <a:ln w="38100">
+              <a:solidFill>
+                <a:schemeClr val="accent6"/>
+              </a:solidFill>
+            </a:ln>
+          </p:spPr>
+          <p:style>
+            <a:lnRef idx="2">
+              <a:schemeClr val="accent1">
+                <a:shade val="15000"/>
+              </a:schemeClr>
+            </a:lnRef>
+            <a:fillRef idx="1">
+              <a:schemeClr val="accent1"/>
+            </a:fillRef>
+            <a:effectRef idx="0">
+              <a:schemeClr val="accent1"/>
+            </a:effectRef>
+            <a:fontRef idx="minor">
+              <a:schemeClr val="lt1"/>
+            </a:fontRef>
+          </p:style>
+          <p:txBody>
+            <a:bodyPr rtlCol="0" anchor="ctr"/>
+            <a:lstStyle/>
+            <a:p>
+              <a:pPr algn="ctr"/>
+              <a:endParaRPr lang="en-US"/>
+            </a:p>
+          </p:txBody>
+        </p:sp>
+        <p:cxnSp>
+          <p:nvCxnSpPr>
+            <p:cNvPr id="12" name="Straight Arrow Connector 11">
+              <a:extLst>
+                <a:ext uri="{FF2B5EF4-FFF2-40B4-BE49-F238E27FC236}">
+                  <a16:creationId xmlns:a16="http://schemas.microsoft.com/office/drawing/2014/main" id="{E33E1220-4D73-C733-5BFD-970D6C684382}"/>
+                </a:ext>
+              </a:extLst>
+            </p:cNvPr>
+            <p:cNvCxnSpPr>
+              <a:cxnSpLocks/>
+            </p:cNvCxnSpPr>
+            <p:nvPr/>
+          </p:nvCxnSpPr>
+          <p:spPr>
+            <a:xfrm>
+              <a:off x="6096000" y="1726692"/>
+              <a:ext cx="371475" cy="0"/>
+            </a:xfrm>
+            <a:prstGeom prst="straightConnector1">
+              <a:avLst/>
+            </a:prstGeom>
+            <a:ln w="38100">
+              <a:solidFill>
+                <a:schemeClr val="accent6"/>
+              </a:solidFill>
+              <a:tailEnd type="triangle"/>
+            </a:ln>
+          </p:spPr>
+          <p:style>
+            <a:lnRef idx="2">
+              <a:schemeClr val="accent1"/>
+            </a:lnRef>
+            <a:fillRef idx="0">
+              <a:schemeClr val="accent1"/>
+            </a:fillRef>
+            <a:effectRef idx="1">
+              <a:schemeClr val="accent1"/>
+            </a:effectRef>
+            <a:fontRef idx="minor">
+              <a:schemeClr val="tx1"/>
+            </a:fontRef>
+          </p:style>
+        </p:cxnSp>
+      </p:grpSp>
+    </p:spTree>
+    <p:extLst>
+      <p:ext uri="{BB962C8B-B14F-4D97-AF65-F5344CB8AC3E}">
+        <p14:creationId xmlns:p14="http://schemas.microsoft.com/office/powerpoint/2010/main" val="3807869640"/>
+      </p:ext>
+    </p:extLst>
+  </p:cSld>
+  <p:clrMapOvr>
+    <a:masterClrMapping/>
+  </p:clrMapOvr>
+</p:sld>
+</file>
+
+<file path=ppt/slides/slide7.xml><?xml version="1.0" encoding="utf-8"?>
+<p:sld xmlns:a="http://schemas.openxmlformats.org/drawingml/2006/main" xmlns:r="http://schemas.openxmlformats.org/officeDocument/2006/relationships" xmlns:p="http://schemas.openxmlformats.org/presentationml/2006/main">
+  <p:cSld>
+    <p:spTree>
+      <p:nvGrpSpPr>
+        <p:cNvPr id="1" name=""/>
+        <p:cNvGrpSpPr/>
+        <p:nvPr/>
+      </p:nvGrpSpPr>
+      <p:grpSpPr>
+        <a:xfrm>
+          <a:off x="0" y="0"/>
+          <a:ext cx="0" cy="0"/>
+          <a:chOff x="0" y="0"/>
+          <a:chExt cx="0" cy="0"/>
+        </a:xfrm>
+      </p:grpSpPr>
+      <p:grpSp>
+        <p:nvGrpSpPr>
+          <p:cNvPr id="19" name="Group 18">
+            <a:extLst>
+              <a:ext uri="{FF2B5EF4-FFF2-40B4-BE49-F238E27FC236}">
+                <a16:creationId xmlns:a16="http://schemas.microsoft.com/office/drawing/2014/main" id="{867472AE-4AAA-6FD6-3CF7-CC21AC8ADBD8}"/>
+              </a:ext>
+            </a:extLst>
+          </p:cNvPr>
+          <p:cNvGrpSpPr/>
+          <p:nvPr/>
+        </p:nvGrpSpPr>
+        <p:grpSpPr>
+          <a:xfrm>
+            <a:off x="0" y="174828"/>
+            <a:ext cx="12192000" cy="6508344"/>
+            <a:chOff x="0" y="174828"/>
+            <a:chExt cx="12192000" cy="6508344"/>
+          </a:xfrm>
+        </p:grpSpPr>
+        <p:pic>
+          <p:nvPicPr>
+            <p:cNvPr id="7" name="Picture 6" descr="A screenshot of a computer&#10;&#10;Description automatically generated">
+              <a:extLst>
+                <a:ext uri="{FF2B5EF4-FFF2-40B4-BE49-F238E27FC236}">
+                  <a16:creationId xmlns:a16="http://schemas.microsoft.com/office/drawing/2014/main" id="{4B56E16A-A361-6D28-563A-F22DB1AC0B55}"/>
+                </a:ext>
+              </a:extLst>
+            </p:cNvPr>
+            <p:cNvPicPr>
+              <a:picLocks noChangeAspect="1"/>
+            </p:cNvPicPr>
+            <p:nvPr/>
+          </p:nvPicPr>
+          <p:blipFill>
+            <a:blip r:embed="rId2">
+              <a:extLst>
+                <a:ext uri="{28A0092B-C50C-407E-A947-70E740481C1C}">
+                  <a14:useLocalDpi xmlns:a14="http://schemas.microsoft.com/office/drawing/2010/main" val="0"/>
+                </a:ext>
+              </a:extLst>
+            </a:blip>
+            <a:stretch>
+              <a:fillRect/>
+            </a:stretch>
+          </p:blipFill>
+          <p:spPr>
+            <a:xfrm>
+              <a:off x="0" y="174828"/>
+              <a:ext cx="12192000" cy="6508344"/>
+            </a:xfrm>
+            <a:prstGeom prst="rect">
+              <a:avLst/>
+            </a:prstGeom>
+          </p:spPr>
+        </p:pic>
+        <p:sp>
+          <p:nvSpPr>
+            <p:cNvPr id="2" name="Rectangle 1">
+              <a:extLst>
+                <a:ext uri="{FF2B5EF4-FFF2-40B4-BE49-F238E27FC236}">
+                  <a16:creationId xmlns:a16="http://schemas.microsoft.com/office/drawing/2014/main" id="{2AB9DFF7-D4F7-F94F-474E-BB300CA84EA4}"/>
+                </a:ext>
+              </a:extLst>
+            </p:cNvPr>
+            <p:cNvSpPr/>
+            <p:nvPr/>
+          </p:nvSpPr>
+          <p:spPr>
+            <a:xfrm>
+              <a:off x="91440" y="3195828"/>
+              <a:ext cx="786384" cy="374904"/>
+            </a:xfrm>
+            <a:prstGeom prst="rect">
+              <a:avLst/>
+            </a:prstGeom>
+            <a:noFill/>
+            <a:ln w="38100">
+              <a:solidFill>
+                <a:schemeClr val="accent6"/>
+              </a:solidFill>
+            </a:ln>
+          </p:spPr>
+          <p:style>
+            <a:lnRef idx="2">
+              <a:schemeClr val="accent1">
+                <a:shade val="15000"/>
+              </a:schemeClr>
+            </a:lnRef>
+            <a:fillRef idx="1">
+              <a:schemeClr val="accent1"/>
+            </a:fillRef>
+            <a:effectRef idx="0">
+              <a:schemeClr val="accent1"/>
+            </a:effectRef>
+            <a:fontRef idx="minor">
+              <a:schemeClr val="lt1"/>
+            </a:fontRef>
+          </p:style>
+          <p:txBody>
+            <a:bodyPr rtlCol="0" anchor="ctr"/>
+            <a:lstStyle/>
+            <a:p>
+              <a:pPr algn="ctr"/>
+              <a:endParaRPr lang="en-US"/>
+            </a:p>
+          </p:txBody>
+        </p:sp>
+        <p:cxnSp>
+          <p:nvCxnSpPr>
+            <p:cNvPr id="3" name="Straight Arrow Connector 2">
+              <a:extLst>
+                <a:ext uri="{FF2B5EF4-FFF2-40B4-BE49-F238E27FC236}">
+                  <a16:creationId xmlns:a16="http://schemas.microsoft.com/office/drawing/2014/main" id="{875266D7-BB80-32EB-944D-BEC29F75EB8C}"/>
+                </a:ext>
+              </a:extLst>
+            </p:cNvPr>
+            <p:cNvCxnSpPr/>
+            <p:nvPr/>
+          </p:nvCxnSpPr>
+          <p:spPr>
+            <a:xfrm flipH="1">
+              <a:off x="993267" y="3374136"/>
+              <a:ext cx="314325" cy="0"/>
+            </a:xfrm>
+            <a:prstGeom prst="straightConnector1">
+              <a:avLst/>
+            </a:prstGeom>
+            <a:ln w="38100">
+              <a:solidFill>
+                <a:schemeClr val="accent6"/>
+              </a:solidFill>
+              <a:tailEnd type="triangle"/>
+            </a:ln>
+          </p:spPr>
+          <p:style>
+            <a:lnRef idx="2">
+              <a:schemeClr val="accent1"/>
+            </a:lnRef>
+            <a:fillRef idx="0">
+              <a:schemeClr val="accent1"/>
+            </a:fillRef>
+            <a:effectRef idx="1">
+              <a:schemeClr val="accent1"/>
+            </a:effectRef>
+            <a:fontRef idx="minor">
+              <a:schemeClr val="tx1"/>
+            </a:fontRef>
+          </p:style>
+        </p:cxnSp>
+        <p:sp>
+          <p:nvSpPr>
+            <p:cNvPr id="4" name="Rectangle 3">
+              <a:extLst>
+                <a:ext uri="{FF2B5EF4-FFF2-40B4-BE49-F238E27FC236}">
+                  <a16:creationId xmlns:a16="http://schemas.microsoft.com/office/drawing/2014/main" id="{284E561F-4810-A7B8-8E4A-842B91E65598}"/>
+                </a:ext>
+              </a:extLst>
+            </p:cNvPr>
+            <p:cNvSpPr/>
+            <p:nvPr/>
+          </p:nvSpPr>
+          <p:spPr>
+            <a:xfrm>
+              <a:off x="6702552" y="5358384"/>
+              <a:ext cx="3057144" cy="292608"/>
+            </a:xfrm>
+            <a:prstGeom prst="rect">
+              <a:avLst/>
+            </a:prstGeom>
+            <a:noFill/>
+            <a:ln w="38100">
+              <a:solidFill>
+                <a:schemeClr val="accent6"/>
+              </a:solidFill>
+            </a:ln>
+          </p:spPr>
+          <p:style>
+            <a:lnRef idx="2">
+              <a:schemeClr val="accent1">
+                <a:shade val="15000"/>
+              </a:schemeClr>
+            </a:lnRef>
+            <a:fillRef idx="1">
+              <a:schemeClr val="accent1"/>
+            </a:fillRef>
+            <a:effectRef idx="0">
+              <a:schemeClr val="accent1"/>
+            </a:effectRef>
+            <a:fontRef idx="minor">
+              <a:schemeClr val="lt1"/>
+            </a:fontRef>
+          </p:style>
+          <p:txBody>
+            <a:bodyPr rtlCol="0" anchor="ctr"/>
+            <a:lstStyle/>
+            <a:p>
+              <a:pPr algn="ctr"/>
+              <a:endParaRPr lang="en-US"/>
+            </a:p>
+          </p:txBody>
+        </p:sp>
+        <p:sp>
+          <p:nvSpPr>
+            <p:cNvPr id="8" name="Rectangle 7">
+              <a:extLst>
+                <a:ext uri="{FF2B5EF4-FFF2-40B4-BE49-F238E27FC236}">
+                  <a16:creationId xmlns:a16="http://schemas.microsoft.com/office/drawing/2014/main" id="{EA1B7BCE-462D-3C4E-E6A4-69047D01C3B5}"/>
+                </a:ext>
+              </a:extLst>
+            </p:cNvPr>
+            <p:cNvSpPr/>
+            <p:nvPr/>
+          </p:nvSpPr>
+          <p:spPr>
+            <a:xfrm>
+              <a:off x="7943088" y="3049524"/>
+              <a:ext cx="1264920" cy="292608"/>
+            </a:xfrm>
+            <a:prstGeom prst="rect">
+              <a:avLst/>
+            </a:prstGeom>
+            <a:noFill/>
+            <a:ln w="38100">
+              <a:solidFill>
+                <a:schemeClr val="accent6"/>
+              </a:solidFill>
+            </a:ln>
+          </p:spPr>
+          <p:style>
+            <a:lnRef idx="2">
+              <a:schemeClr val="accent1">
+                <a:shade val="15000"/>
+              </a:schemeClr>
+            </a:lnRef>
+            <a:fillRef idx="1">
+              <a:schemeClr val="accent1"/>
+            </a:fillRef>
+            <a:effectRef idx="0">
+              <a:schemeClr val="accent1"/>
+            </a:effectRef>
+            <a:fontRef idx="minor">
+              <a:schemeClr val="lt1"/>
+            </a:fontRef>
+          </p:style>
+          <p:txBody>
+            <a:bodyPr rtlCol="0" anchor="ctr"/>
+            <a:lstStyle/>
+            <a:p>
+              <a:pPr algn="ctr"/>
+              <a:endParaRPr lang="en-US"/>
+            </a:p>
+          </p:txBody>
+        </p:sp>
+        <p:cxnSp>
+          <p:nvCxnSpPr>
+            <p:cNvPr id="9" name="Straight Arrow Connector 8">
+              <a:extLst>
+                <a:ext uri="{FF2B5EF4-FFF2-40B4-BE49-F238E27FC236}">
+                  <a16:creationId xmlns:a16="http://schemas.microsoft.com/office/drawing/2014/main" id="{7AFAAEDB-274E-9A76-2D7F-38E37B99D96F}"/>
+                </a:ext>
+              </a:extLst>
+            </p:cNvPr>
+            <p:cNvCxnSpPr/>
+            <p:nvPr/>
+          </p:nvCxnSpPr>
+          <p:spPr>
+            <a:xfrm flipH="1">
+              <a:off x="9869043" y="5492496"/>
+              <a:ext cx="314325" cy="0"/>
+            </a:xfrm>
+            <a:prstGeom prst="straightConnector1">
+              <a:avLst/>
+            </a:prstGeom>
+            <a:ln w="38100">
+              <a:solidFill>
+                <a:schemeClr val="accent6"/>
+              </a:solidFill>
+              <a:tailEnd type="triangle"/>
+            </a:ln>
+          </p:spPr>
+          <p:style>
+            <a:lnRef idx="2">
+              <a:schemeClr val="accent1"/>
+            </a:lnRef>
+            <a:fillRef idx="0">
+              <a:schemeClr val="accent1"/>
+            </a:fillRef>
+            <a:effectRef idx="1">
+              <a:schemeClr val="accent1"/>
+            </a:effectRef>
+            <a:fontRef idx="minor">
+              <a:schemeClr val="tx1"/>
+            </a:fontRef>
+          </p:style>
+        </p:cxnSp>
+        <p:cxnSp>
+          <p:nvCxnSpPr>
+            <p:cNvPr id="10" name="Straight Arrow Connector 9">
+              <a:extLst>
+                <a:ext uri="{FF2B5EF4-FFF2-40B4-BE49-F238E27FC236}">
+                  <a16:creationId xmlns:a16="http://schemas.microsoft.com/office/drawing/2014/main" id="{63727F08-9F2A-A371-5F73-D3D1F7CBA867}"/>
+                </a:ext>
+              </a:extLst>
+            </p:cNvPr>
+            <p:cNvCxnSpPr>
+              <a:cxnSpLocks/>
+            </p:cNvCxnSpPr>
+            <p:nvPr/>
+          </p:nvCxnSpPr>
+          <p:spPr>
+            <a:xfrm flipV="1">
+              <a:off x="8631936" y="3374136"/>
+              <a:ext cx="0" cy="178308"/>
+            </a:xfrm>
+            <a:prstGeom prst="straightConnector1">
+              <a:avLst/>
+            </a:prstGeom>
+            <a:ln w="38100">
+              <a:solidFill>
+                <a:schemeClr val="accent6"/>
+              </a:solidFill>
+              <a:tailEnd type="triangle"/>
+            </a:ln>
+          </p:spPr>
+          <p:style>
+            <a:lnRef idx="2">
+              <a:schemeClr val="accent1"/>
+            </a:lnRef>
+            <a:fillRef idx="0">
+              <a:schemeClr val="accent1"/>
+            </a:fillRef>
+            <a:effectRef idx="1">
+              <a:schemeClr val="accent1"/>
+            </a:effectRef>
+            <a:fontRef idx="minor">
+              <a:schemeClr val="tx1"/>
+            </a:fontRef>
+          </p:style>
+        </p:cxnSp>
+        <p:sp>
+          <p:nvSpPr>
+            <p:cNvPr id="16" name="Rectangle 15">
+              <a:extLst>
+                <a:ext uri="{FF2B5EF4-FFF2-40B4-BE49-F238E27FC236}">
+                  <a16:creationId xmlns:a16="http://schemas.microsoft.com/office/drawing/2014/main" id="{72453968-5FC3-2AD4-3331-22C9B07CFCF4}"/>
+                </a:ext>
+              </a:extLst>
+            </p:cNvPr>
+            <p:cNvSpPr/>
+            <p:nvPr/>
+          </p:nvSpPr>
+          <p:spPr>
+            <a:xfrm>
+              <a:off x="7999476" y="2319096"/>
+              <a:ext cx="376428" cy="177216"/>
+            </a:xfrm>
+            <a:prstGeom prst="rect">
+              <a:avLst/>
+            </a:prstGeom>
+            <a:noFill/>
+            <a:ln w="38100">
+              <a:solidFill>
+                <a:schemeClr val="accent6"/>
+              </a:solidFill>
+            </a:ln>
+          </p:spPr>
+          <p:style>
+            <a:lnRef idx="2">
+              <a:schemeClr val="accent1">
+                <a:shade val="15000"/>
+              </a:schemeClr>
+            </a:lnRef>
+            <a:fillRef idx="1">
+              <a:schemeClr val="accent1"/>
+            </a:fillRef>
+            <a:effectRef idx="0">
+              <a:schemeClr val="accent1"/>
+            </a:effectRef>
+            <a:fontRef idx="minor">
+              <a:schemeClr val="lt1"/>
+            </a:fontRef>
+          </p:style>
+          <p:txBody>
+            <a:bodyPr rtlCol="0" anchor="ctr"/>
+            <a:lstStyle/>
+            <a:p>
+              <a:pPr algn="ctr"/>
+              <a:endParaRPr lang="en-US"/>
+            </a:p>
+          </p:txBody>
+        </p:sp>
+        <p:cxnSp>
+          <p:nvCxnSpPr>
+            <p:cNvPr id="17" name="Straight Arrow Connector 16">
+              <a:extLst>
+                <a:ext uri="{FF2B5EF4-FFF2-40B4-BE49-F238E27FC236}">
+                  <a16:creationId xmlns:a16="http://schemas.microsoft.com/office/drawing/2014/main" id="{ABBC0C65-BCAC-6BA4-7F80-F583C7621153}"/>
+                </a:ext>
+              </a:extLst>
+            </p:cNvPr>
+            <p:cNvCxnSpPr>
+              <a:cxnSpLocks/>
+            </p:cNvCxnSpPr>
+            <p:nvPr/>
+          </p:nvCxnSpPr>
+          <p:spPr>
+            <a:xfrm>
+              <a:off x="8153019" y="1956816"/>
+              <a:ext cx="0" cy="198120"/>
+            </a:xfrm>
+            <a:prstGeom prst="straightConnector1">
+              <a:avLst/>
+            </a:prstGeom>
+            <a:ln w="38100">
+              <a:solidFill>
+                <a:schemeClr val="accent6"/>
+              </a:solidFill>
+              <a:tailEnd type="triangle"/>
+            </a:ln>
+          </p:spPr>
+          <p:style>
+            <a:lnRef idx="2">
+              <a:schemeClr val="accent1"/>
+            </a:lnRef>
+            <a:fillRef idx="0">
+              <a:schemeClr val="accent1"/>
+            </a:fillRef>
+            <a:effectRef idx="1">
+              <a:schemeClr val="accent1"/>
+            </a:effectRef>
+            <a:fontRef idx="minor">
+              <a:schemeClr val="tx1"/>
+            </a:fontRef>
+          </p:style>
+        </p:cxnSp>
+      </p:grpSp>
+    </p:spTree>
+    <p:extLst>
+      <p:ext uri="{BB962C8B-B14F-4D97-AF65-F5344CB8AC3E}">
+        <p14:creationId xmlns:p14="http://schemas.microsoft.com/office/powerpoint/2010/main" val="1986858985"/>
+      </p:ext>
+    </p:extLst>
+  </p:cSld>
+  <p:clrMapOvr>
+    <a:masterClrMapping/>
+  </p:clrMapOvr>
+</p:sld>
+</file>
+
+<file path=ppt/slides/slide8.xml><?xml version="1.0" encoding="utf-8"?>
+<p:sld xmlns:a="http://schemas.openxmlformats.org/drawingml/2006/main" xmlns:r="http://schemas.openxmlformats.org/officeDocument/2006/relationships" xmlns:p="http://schemas.openxmlformats.org/presentationml/2006/main">
+  <p:cSld>
+    <p:spTree>
+      <p:nvGrpSpPr>
+        <p:cNvPr id="1" name=""/>
+        <p:cNvGrpSpPr/>
+        <p:nvPr/>
+      </p:nvGrpSpPr>
+      <p:grpSpPr>
+        <a:xfrm>
+          <a:off x="0" y="0"/>
+          <a:ext cx="0" cy="0"/>
+          <a:chOff x="0" y="0"/>
+          <a:chExt cx="0" cy="0"/>
+        </a:xfrm>
+      </p:grpSpPr>
+      <p:grpSp>
+        <p:nvGrpSpPr>
+          <p:cNvPr id="24" name="Group 23">
+            <a:extLst>
+              <a:ext uri="{FF2B5EF4-FFF2-40B4-BE49-F238E27FC236}">
+                <a16:creationId xmlns:a16="http://schemas.microsoft.com/office/drawing/2014/main" id="{B96F9FD6-5C4E-3E72-3885-DB3DE826C9E0}"/>
+              </a:ext>
+            </a:extLst>
+          </p:cNvPr>
+          <p:cNvGrpSpPr/>
+          <p:nvPr/>
+        </p:nvGrpSpPr>
+        <p:grpSpPr>
+          <a:xfrm>
+            <a:off x="0" y="184235"/>
+            <a:ext cx="12192000" cy="6489530"/>
+            <a:chOff x="0" y="184235"/>
+            <a:chExt cx="12192000" cy="6489530"/>
+          </a:xfrm>
+        </p:grpSpPr>
+        <p:pic>
+          <p:nvPicPr>
+            <p:cNvPr id="21" name="Picture 20" descr="A screenshot of a computer&#10;&#10;Description automatically generated">
+              <a:extLst>
+                <a:ext uri="{FF2B5EF4-FFF2-40B4-BE49-F238E27FC236}">
+                  <a16:creationId xmlns:a16="http://schemas.microsoft.com/office/drawing/2014/main" id="{19878A61-86FB-ABED-02CE-78A171C97849}"/>
+                </a:ext>
+              </a:extLst>
+            </p:cNvPr>
+            <p:cNvPicPr>
+              <a:picLocks noChangeAspect="1"/>
+            </p:cNvPicPr>
+            <p:nvPr/>
+          </p:nvPicPr>
+          <p:blipFill>
+            <a:blip r:embed="rId2">
+              <a:extLst>
+                <a:ext uri="{28A0092B-C50C-407E-A947-70E740481C1C}">
+                  <a14:useLocalDpi xmlns:a14="http://schemas.microsoft.com/office/drawing/2010/main" val="0"/>
+                </a:ext>
+              </a:extLst>
+            </a:blip>
+            <a:stretch>
+              <a:fillRect/>
+            </a:stretch>
+          </p:blipFill>
+          <p:spPr>
+            <a:xfrm>
+              <a:off x="0" y="184235"/>
+              <a:ext cx="12192000" cy="6489530"/>
+            </a:xfrm>
+            <a:prstGeom prst="rect">
+              <a:avLst/>
+            </a:prstGeom>
+          </p:spPr>
+        </p:pic>
+        <p:sp>
+          <p:nvSpPr>
+            <p:cNvPr id="6" name="Rectangle 5">
+              <a:extLst>
+                <a:ext uri="{FF2B5EF4-FFF2-40B4-BE49-F238E27FC236}">
+                  <a16:creationId xmlns:a16="http://schemas.microsoft.com/office/drawing/2014/main" id="{EF7CB984-1E7F-3D94-114C-B24280FBEC22}"/>
+                </a:ext>
+              </a:extLst>
+            </p:cNvPr>
+            <p:cNvSpPr/>
+            <p:nvPr/>
+          </p:nvSpPr>
+          <p:spPr>
+            <a:xfrm>
+              <a:off x="91439" y="3195828"/>
+              <a:ext cx="5528692" cy="1869948"/>
+            </a:xfrm>
+            <a:prstGeom prst="rect">
+              <a:avLst/>
+            </a:prstGeom>
+            <a:noFill/>
+            <a:ln w="38100">
+              <a:solidFill>
+                <a:schemeClr val="accent6"/>
+              </a:solidFill>
+            </a:ln>
+          </p:spPr>
+          <p:style>
+            <a:lnRef idx="2">
+              <a:schemeClr val="accent1">
+                <a:shade val="15000"/>
+              </a:schemeClr>
+            </a:lnRef>
+            <a:fillRef idx="1">
+              <a:schemeClr val="accent1"/>
+            </a:fillRef>
+            <a:effectRef idx="0">
+              <a:schemeClr val="accent1"/>
+            </a:effectRef>
+            <a:fontRef idx="minor">
+              <a:schemeClr val="lt1"/>
+            </a:fontRef>
+          </p:style>
+          <p:txBody>
+            <a:bodyPr rtlCol="0" anchor="ctr"/>
+            <a:lstStyle/>
+            <a:p>
+              <a:pPr algn="ctr"/>
+              <a:endParaRPr lang="en-US"/>
+            </a:p>
+          </p:txBody>
+        </p:sp>
+        <p:cxnSp>
+          <p:nvCxnSpPr>
+            <p:cNvPr id="7" name="Straight Arrow Connector 6">
+              <a:extLst>
+                <a:ext uri="{FF2B5EF4-FFF2-40B4-BE49-F238E27FC236}">
+                  <a16:creationId xmlns:a16="http://schemas.microsoft.com/office/drawing/2014/main" id="{60ADFDAB-A012-F300-552B-295A6EB249CA}"/>
+                </a:ext>
+              </a:extLst>
+            </p:cNvPr>
+            <p:cNvCxnSpPr>
+              <a:cxnSpLocks/>
+            </p:cNvCxnSpPr>
+            <p:nvPr/>
+          </p:nvCxnSpPr>
+          <p:spPr>
+            <a:xfrm flipH="1">
+              <a:off x="5684139" y="4187952"/>
+              <a:ext cx="314325" cy="0"/>
+            </a:xfrm>
+            <a:prstGeom prst="straightConnector1">
+              <a:avLst/>
+            </a:prstGeom>
+            <a:ln w="38100">
+              <a:solidFill>
+                <a:schemeClr val="accent6"/>
+              </a:solidFill>
+              <a:tailEnd type="triangle"/>
+            </a:ln>
+          </p:spPr>
+          <p:style>
+            <a:lnRef idx="2">
+              <a:schemeClr val="accent1"/>
+            </a:lnRef>
+            <a:fillRef idx="0">
+              <a:schemeClr val="accent1"/>
+            </a:fillRef>
+            <a:effectRef idx="1">
+              <a:schemeClr val="accent1"/>
+            </a:effectRef>
+            <a:fontRef idx="minor">
+              <a:schemeClr val="tx1"/>
+            </a:fontRef>
+          </p:style>
+        </p:cxnSp>
+        <p:sp>
+          <p:nvSpPr>
+            <p:cNvPr id="9" name="Rectangle 8">
+              <a:extLst>
+                <a:ext uri="{FF2B5EF4-FFF2-40B4-BE49-F238E27FC236}">
+                  <a16:creationId xmlns:a16="http://schemas.microsoft.com/office/drawing/2014/main" id="{D88820CE-8381-05E2-5FE6-C334C17D739D}"/>
+                </a:ext>
+              </a:extLst>
+            </p:cNvPr>
+            <p:cNvSpPr/>
+            <p:nvPr/>
+          </p:nvSpPr>
+          <p:spPr>
+            <a:xfrm>
+              <a:off x="6608064" y="1819656"/>
+              <a:ext cx="5516880" cy="457200"/>
+            </a:xfrm>
+            <a:prstGeom prst="rect">
+              <a:avLst/>
+            </a:prstGeom>
+            <a:noFill/>
+            <a:ln w="38100">
+              <a:solidFill>
+                <a:schemeClr val="accent6"/>
+              </a:solidFill>
+            </a:ln>
+          </p:spPr>
+          <p:style>
+            <a:lnRef idx="2">
+              <a:schemeClr val="accent1">
+                <a:shade val="15000"/>
+              </a:schemeClr>
+            </a:lnRef>
+            <a:fillRef idx="1">
+              <a:schemeClr val="accent1"/>
+            </a:fillRef>
+            <a:effectRef idx="0">
+              <a:schemeClr val="accent1"/>
+            </a:effectRef>
+            <a:fontRef idx="minor">
+              <a:schemeClr val="lt1"/>
+            </a:fontRef>
+          </p:style>
+          <p:txBody>
+            <a:bodyPr rtlCol="0" anchor="ctr"/>
+            <a:lstStyle/>
+            <a:p>
+              <a:pPr algn="ctr"/>
+              <a:endParaRPr lang="en-US"/>
+            </a:p>
+          </p:txBody>
+        </p:sp>
+        <p:cxnSp>
+          <p:nvCxnSpPr>
+            <p:cNvPr id="10" name="Straight Arrow Connector 9">
+              <a:extLst>
+                <a:ext uri="{FF2B5EF4-FFF2-40B4-BE49-F238E27FC236}">
+                  <a16:creationId xmlns:a16="http://schemas.microsoft.com/office/drawing/2014/main" id="{B1CED1BE-FB17-716C-2E5C-B32D9F0C3F51}"/>
+                </a:ext>
+              </a:extLst>
+            </p:cNvPr>
+            <p:cNvCxnSpPr>
+              <a:cxnSpLocks/>
+            </p:cNvCxnSpPr>
+            <p:nvPr/>
+          </p:nvCxnSpPr>
+          <p:spPr>
+            <a:xfrm>
+              <a:off x="6144768" y="2093977"/>
+              <a:ext cx="323090" cy="0"/>
+            </a:xfrm>
+            <a:prstGeom prst="straightConnector1">
+              <a:avLst/>
+            </a:prstGeom>
+            <a:ln w="38100">
+              <a:solidFill>
+                <a:schemeClr val="accent6"/>
+              </a:solidFill>
+              <a:tailEnd type="triangle"/>
+            </a:ln>
+          </p:spPr>
+          <p:style>
+            <a:lnRef idx="2">
+              <a:schemeClr val="accent1"/>
+            </a:lnRef>
+            <a:fillRef idx="0">
+              <a:schemeClr val="accent1"/>
+            </a:fillRef>
+            <a:effectRef idx="1">
+              <a:schemeClr val="accent1"/>
+            </a:effectRef>
+            <a:fontRef idx="minor">
+              <a:schemeClr val="tx1"/>
+            </a:fontRef>
+          </p:style>
+        </p:cxnSp>
+      </p:grpSp>
+    </p:spTree>
+    <p:extLst>
+      <p:ext uri="{BB962C8B-B14F-4D97-AF65-F5344CB8AC3E}">
+        <p14:creationId xmlns:p14="http://schemas.microsoft.com/office/powerpoint/2010/main" val="1370006056"/>
+      </p:ext>
+    </p:extLst>
+  </p:cSld>
+  <p:clrMapOvr>
+    <a:masterClrMapping/>
+  </p:clrMapOvr>
+</p:sld>
+</file>
+
 <file path=ppt/theme/theme1.xml><?xml version="1.0" encoding="utf-8"?>
 <a:theme xmlns:a="http://schemas.openxmlformats.org/drawingml/2006/main" name="Office Theme">
   <a:themeElements>

</xml_diff>

<commit_message>
Adding section scripts appendix intro to R
</commit_message>
<xml_diff>
--- a/images/000_edit_images.pptx
+++ b/images/000_edit_images.pptx
@@ -13,6 +13,12 @@
     <p:sldId id="261" r:id="rId7"/>
     <p:sldId id="263" r:id="rId8"/>
     <p:sldId id="264" r:id="rId9"/>
+    <p:sldId id="265" r:id="rId10"/>
+    <p:sldId id="266" r:id="rId11"/>
+    <p:sldId id="267" r:id="rId12"/>
+    <p:sldId id="268" r:id="rId13"/>
+    <p:sldId id="271" r:id="rId14"/>
+    <p:sldId id="272" r:id="rId15"/>
   </p:sldIdLst>
   <p:sldSz cx="12192000" cy="6858000"/>
   <p:notesSz cx="6858000" cy="9144000"/>
@@ -266,7 +272,7 @@
           <a:p>
             <a:fld id="{55C57227-F9A5-4AB4-8A09-D6AFBCD7EA65}" type="datetimeFigureOut">
               <a:rPr lang="en-US" smtClean="0"/>
-              <a:t>2024-04-27</a:t>
+              <a:t>2024-05-01</a:t>
             </a:fld>
             <a:endParaRPr lang="en-US"/>
           </a:p>
@@ -464,7 +470,7 @@
           <a:p>
             <a:fld id="{55C57227-F9A5-4AB4-8A09-D6AFBCD7EA65}" type="datetimeFigureOut">
               <a:rPr lang="en-US" smtClean="0"/>
-              <a:t>2024-04-27</a:t>
+              <a:t>2024-05-01</a:t>
             </a:fld>
             <a:endParaRPr lang="en-US"/>
           </a:p>
@@ -672,7 +678,7 @@
           <a:p>
             <a:fld id="{55C57227-F9A5-4AB4-8A09-D6AFBCD7EA65}" type="datetimeFigureOut">
               <a:rPr lang="en-US" smtClean="0"/>
-              <a:t>2024-04-27</a:t>
+              <a:t>2024-05-01</a:t>
             </a:fld>
             <a:endParaRPr lang="en-US"/>
           </a:p>
@@ -870,7 +876,7 @@
           <a:p>
             <a:fld id="{55C57227-F9A5-4AB4-8A09-D6AFBCD7EA65}" type="datetimeFigureOut">
               <a:rPr lang="en-US" smtClean="0"/>
-              <a:t>2024-04-27</a:t>
+              <a:t>2024-05-01</a:t>
             </a:fld>
             <a:endParaRPr lang="en-US"/>
           </a:p>
@@ -1145,7 +1151,7 @@
           <a:p>
             <a:fld id="{55C57227-F9A5-4AB4-8A09-D6AFBCD7EA65}" type="datetimeFigureOut">
               <a:rPr lang="en-US" smtClean="0"/>
-              <a:t>2024-04-27</a:t>
+              <a:t>2024-05-01</a:t>
             </a:fld>
             <a:endParaRPr lang="en-US"/>
           </a:p>
@@ -1410,7 +1416,7 @@
           <a:p>
             <a:fld id="{55C57227-F9A5-4AB4-8A09-D6AFBCD7EA65}" type="datetimeFigureOut">
               <a:rPr lang="en-US" smtClean="0"/>
-              <a:t>2024-04-27</a:t>
+              <a:t>2024-05-01</a:t>
             </a:fld>
             <a:endParaRPr lang="en-US"/>
           </a:p>
@@ -1822,7 +1828,7 @@
           <a:p>
             <a:fld id="{55C57227-F9A5-4AB4-8A09-D6AFBCD7EA65}" type="datetimeFigureOut">
               <a:rPr lang="en-US" smtClean="0"/>
-              <a:t>2024-04-27</a:t>
+              <a:t>2024-05-01</a:t>
             </a:fld>
             <a:endParaRPr lang="en-US"/>
           </a:p>
@@ -1963,7 +1969,7 @@
           <a:p>
             <a:fld id="{55C57227-F9A5-4AB4-8A09-D6AFBCD7EA65}" type="datetimeFigureOut">
               <a:rPr lang="en-US" smtClean="0"/>
-              <a:t>2024-04-27</a:t>
+              <a:t>2024-05-01</a:t>
             </a:fld>
             <a:endParaRPr lang="en-US"/>
           </a:p>
@@ -2076,7 +2082,7 @@
           <a:p>
             <a:fld id="{55C57227-F9A5-4AB4-8A09-D6AFBCD7EA65}" type="datetimeFigureOut">
               <a:rPr lang="en-US" smtClean="0"/>
-              <a:t>2024-04-27</a:t>
+              <a:t>2024-05-01</a:t>
             </a:fld>
             <a:endParaRPr lang="en-US"/>
           </a:p>
@@ -2387,7 +2393,7 @@
           <a:p>
             <a:fld id="{55C57227-F9A5-4AB4-8A09-D6AFBCD7EA65}" type="datetimeFigureOut">
               <a:rPr lang="en-US" smtClean="0"/>
-              <a:t>2024-04-27</a:t>
+              <a:t>2024-05-01</a:t>
             </a:fld>
             <a:endParaRPr lang="en-US"/>
           </a:p>
@@ -2675,7 +2681,7 @@
           <a:p>
             <a:fld id="{55C57227-F9A5-4AB4-8A09-D6AFBCD7EA65}" type="datetimeFigureOut">
               <a:rPr lang="en-US" smtClean="0"/>
-              <a:t>2024-04-27</a:t>
+              <a:t>2024-05-01</a:t>
             </a:fld>
             <a:endParaRPr lang="en-US"/>
           </a:p>
@@ -2752,9 +2758,14 @@
 <p:sldMaster xmlns:a="http://schemas.openxmlformats.org/drawingml/2006/main" xmlns:r="http://schemas.openxmlformats.org/officeDocument/2006/relationships" xmlns:p="http://schemas.openxmlformats.org/presentationml/2006/main">
   <p:cSld>
     <p:bg>
-      <p:bgRef idx="1001">
-        <a:schemeClr val="bg1"/>
-      </p:bgRef>
+      <p:bgPr>
+        <a:solidFill>
+          <a:schemeClr val="bg1">
+            <a:alpha val="30000"/>
+          </a:schemeClr>
+        </a:solidFill>
+        <a:effectLst/>
+      </p:bgPr>
     </p:bg>
     <p:spTree>
       <p:nvGrpSpPr>
@@ -2916,7 +2927,7 @@
           <a:p>
             <a:fld id="{55C57227-F9A5-4AB4-8A09-D6AFBCD7EA65}" type="datetimeFigureOut">
               <a:rPr lang="en-US" smtClean="0"/>
-              <a:t>2024-04-27</a:t>
+              <a:t>2024-05-01</a:t>
             </a:fld>
             <a:endParaRPr lang="en-US"/>
           </a:p>
@@ -3798,6 +3809,1168 @@
 </p:sld>
 </file>
 
+<file path=ppt/slides/slide10.xml><?xml version="1.0" encoding="utf-8"?>
+<p:sld xmlns:a="http://schemas.openxmlformats.org/drawingml/2006/main" xmlns:r="http://schemas.openxmlformats.org/officeDocument/2006/relationships" xmlns:p="http://schemas.openxmlformats.org/presentationml/2006/main">
+  <p:cSld>
+    <p:spTree>
+      <p:nvGrpSpPr>
+        <p:cNvPr id="1" name=""/>
+        <p:cNvGrpSpPr/>
+        <p:nvPr/>
+      </p:nvGrpSpPr>
+      <p:grpSpPr>
+        <a:xfrm>
+          <a:off x="0" y="0"/>
+          <a:ext cx="0" cy="0"/>
+          <a:chOff x="0" y="0"/>
+          <a:chExt cx="0" cy="0"/>
+        </a:xfrm>
+      </p:grpSpPr>
+      <p:grpSp>
+        <p:nvGrpSpPr>
+          <p:cNvPr id="7" name="Group 6">
+            <a:extLst>
+              <a:ext uri="{FF2B5EF4-FFF2-40B4-BE49-F238E27FC236}">
+                <a16:creationId xmlns:a16="http://schemas.microsoft.com/office/drawing/2014/main" id="{C1FA8B44-C56D-1EEC-EBF1-CF119E3AF6A0}"/>
+              </a:ext>
+            </a:extLst>
+          </p:cNvPr>
+          <p:cNvGrpSpPr/>
+          <p:nvPr/>
+        </p:nvGrpSpPr>
+        <p:grpSpPr>
+          <a:xfrm>
+            <a:off x="1593455" y="0"/>
+            <a:ext cx="9005089" cy="6858000"/>
+            <a:chOff x="1593455" y="0"/>
+            <a:chExt cx="9005089" cy="6858000"/>
+          </a:xfrm>
+        </p:grpSpPr>
+        <p:pic>
+          <p:nvPicPr>
+            <p:cNvPr id="5" name="Picture 4" descr="A screenshot of a project&#10;&#10;Description automatically generated">
+              <a:extLst>
+                <a:ext uri="{FF2B5EF4-FFF2-40B4-BE49-F238E27FC236}">
+                  <a16:creationId xmlns:a16="http://schemas.microsoft.com/office/drawing/2014/main" id="{5EA06B92-0DE2-EB39-1532-58F57F9961BA}"/>
+                </a:ext>
+              </a:extLst>
+            </p:cNvPr>
+            <p:cNvPicPr>
+              <a:picLocks noChangeAspect="1"/>
+            </p:cNvPicPr>
+            <p:nvPr/>
+          </p:nvPicPr>
+          <p:blipFill>
+            <a:blip r:embed="rId2">
+              <a:extLst>
+                <a:ext uri="{28A0092B-C50C-407E-A947-70E740481C1C}">
+                  <a14:useLocalDpi xmlns:a14="http://schemas.microsoft.com/office/drawing/2010/main" val="0"/>
+                </a:ext>
+              </a:extLst>
+            </a:blip>
+            <a:stretch>
+              <a:fillRect/>
+            </a:stretch>
+          </p:blipFill>
+          <p:spPr>
+            <a:xfrm>
+              <a:off x="1593455" y="0"/>
+              <a:ext cx="9005089" cy="6858000"/>
+            </a:xfrm>
+            <a:prstGeom prst="rect">
+              <a:avLst/>
+            </a:prstGeom>
+          </p:spPr>
+        </p:pic>
+        <p:sp>
+          <p:nvSpPr>
+            <p:cNvPr id="6" name="Rectangle 5">
+              <a:extLst>
+                <a:ext uri="{FF2B5EF4-FFF2-40B4-BE49-F238E27FC236}">
+                  <a16:creationId xmlns:a16="http://schemas.microsoft.com/office/drawing/2014/main" id="{76AC1A0C-DD2F-EAAB-7DF6-AA58A8E13098}"/>
+                </a:ext>
+              </a:extLst>
+            </p:cNvPr>
+            <p:cNvSpPr/>
+            <p:nvPr/>
+          </p:nvSpPr>
+          <p:spPr>
+            <a:xfrm>
+              <a:off x="1593455" y="1367028"/>
+              <a:ext cx="9005088" cy="1357122"/>
+            </a:xfrm>
+            <a:prstGeom prst="rect">
+              <a:avLst/>
+            </a:prstGeom>
+            <a:noFill/>
+            <a:ln w="38100">
+              <a:solidFill>
+                <a:schemeClr val="accent6"/>
+              </a:solidFill>
+            </a:ln>
+          </p:spPr>
+          <p:style>
+            <a:lnRef idx="2">
+              <a:schemeClr val="accent1">
+                <a:shade val="15000"/>
+              </a:schemeClr>
+            </a:lnRef>
+            <a:fillRef idx="1">
+              <a:schemeClr val="accent1"/>
+            </a:fillRef>
+            <a:effectRef idx="0">
+              <a:schemeClr val="accent1"/>
+            </a:effectRef>
+            <a:fontRef idx="minor">
+              <a:schemeClr val="lt1"/>
+            </a:fontRef>
+          </p:style>
+          <p:txBody>
+            <a:bodyPr rtlCol="0" anchor="ctr"/>
+            <a:lstStyle/>
+            <a:p>
+              <a:pPr algn="ctr"/>
+              <a:endParaRPr lang="en-US"/>
+            </a:p>
+          </p:txBody>
+        </p:sp>
+      </p:grpSp>
+    </p:spTree>
+    <p:extLst>
+      <p:ext uri="{BB962C8B-B14F-4D97-AF65-F5344CB8AC3E}">
+        <p14:creationId xmlns:p14="http://schemas.microsoft.com/office/powerpoint/2010/main" val="3042637207"/>
+      </p:ext>
+    </p:extLst>
+  </p:cSld>
+  <p:clrMapOvr>
+    <a:masterClrMapping/>
+  </p:clrMapOvr>
+</p:sld>
+</file>
+
+<file path=ppt/slides/slide11.xml><?xml version="1.0" encoding="utf-8"?>
+<p:sld xmlns:a="http://schemas.openxmlformats.org/drawingml/2006/main" xmlns:r="http://schemas.openxmlformats.org/officeDocument/2006/relationships" xmlns:p="http://schemas.openxmlformats.org/presentationml/2006/main">
+  <p:cSld>
+    <p:bg>
+      <p:bgPr>
+        <a:solidFill>
+          <a:schemeClr val="bg1"/>
+        </a:solidFill>
+        <a:effectLst/>
+      </p:bgPr>
+    </p:bg>
+    <p:spTree>
+      <p:nvGrpSpPr>
+        <p:cNvPr id="1" name=""/>
+        <p:cNvGrpSpPr/>
+        <p:nvPr/>
+      </p:nvGrpSpPr>
+      <p:grpSpPr>
+        <a:xfrm>
+          <a:off x="0" y="0"/>
+          <a:ext cx="0" cy="0"/>
+          <a:chOff x="0" y="0"/>
+          <a:chExt cx="0" cy="0"/>
+        </a:xfrm>
+      </p:grpSpPr>
+      <p:grpSp>
+        <p:nvGrpSpPr>
+          <p:cNvPr id="26" name="Group 25">
+            <a:extLst>
+              <a:ext uri="{FF2B5EF4-FFF2-40B4-BE49-F238E27FC236}">
+                <a16:creationId xmlns:a16="http://schemas.microsoft.com/office/drawing/2014/main" id="{7587D813-FD77-456D-AF6E-7E7292346D6B}"/>
+              </a:ext>
+            </a:extLst>
+          </p:cNvPr>
+          <p:cNvGrpSpPr/>
+          <p:nvPr/>
+        </p:nvGrpSpPr>
+        <p:grpSpPr>
+          <a:xfrm>
+            <a:off x="673099" y="1404938"/>
+            <a:ext cx="10845801" cy="4048124"/>
+            <a:chOff x="341840" y="1352022"/>
+            <a:chExt cx="10845801" cy="4048124"/>
+          </a:xfrm>
+        </p:grpSpPr>
+        <p:pic>
+          <p:nvPicPr>
+            <p:cNvPr id="10" name="Picture 9" descr="A screenshot of a software project&#10;&#10;Description automatically generated">
+              <a:extLst>
+                <a:ext uri="{FF2B5EF4-FFF2-40B4-BE49-F238E27FC236}">
+                  <a16:creationId xmlns:a16="http://schemas.microsoft.com/office/drawing/2014/main" id="{9042EB21-BF1E-B428-AB98-12E4DBFF91D7}"/>
+                </a:ext>
+              </a:extLst>
+            </p:cNvPr>
+            <p:cNvPicPr>
+              <a:picLocks noChangeAspect="1"/>
+            </p:cNvPicPr>
+            <p:nvPr/>
+          </p:nvPicPr>
+          <p:blipFill>
+            <a:blip r:embed="rId2">
+              <a:extLst>
+                <a:ext uri="{28A0092B-C50C-407E-A947-70E740481C1C}">
+                  <a14:useLocalDpi xmlns:a14="http://schemas.microsoft.com/office/drawing/2010/main" val="0"/>
+                </a:ext>
+              </a:extLst>
+            </a:blip>
+            <a:stretch>
+              <a:fillRect/>
+            </a:stretch>
+          </p:blipFill>
+          <p:spPr>
+            <a:xfrm>
+              <a:off x="5895975" y="1352022"/>
+              <a:ext cx="5291666" cy="4048124"/>
+            </a:xfrm>
+            <a:prstGeom prst="rect">
+              <a:avLst/>
+            </a:prstGeom>
+          </p:spPr>
+        </p:pic>
+        <p:pic>
+          <p:nvPicPr>
+            <p:cNvPr id="8" name="Picture 7" descr="A screenshot of a project type&#10;&#10;Description automatically generated">
+              <a:extLst>
+                <a:ext uri="{FF2B5EF4-FFF2-40B4-BE49-F238E27FC236}">
+                  <a16:creationId xmlns:a16="http://schemas.microsoft.com/office/drawing/2014/main" id="{2B3C6586-262F-F162-B98E-DCB71485F9D3}"/>
+                </a:ext>
+              </a:extLst>
+            </p:cNvPr>
+            <p:cNvPicPr>
+              <a:picLocks noChangeAspect="1"/>
+            </p:cNvPicPr>
+            <p:nvPr/>
+          </p:nvPicPr>
+          <p:blipFill>
+            <a:blip r:embed="rId3">
+              <a:extLst>
+                <a:ext uri="{28A0092B-C50C-407E-A947-70E740481C1C}">
+                  <a14:useLocalDpi xmlns:a14="http://schemas.microsoft.com/office/drawing/2010/main" val="0"/>
+                </a:ext>
+              </a:extLst>
+            </a:blip>
+            <a:stretch>
+              <a:fillRect/>
+            </a:stretch>
+          </p:blipFill>
+          <p:spPr>
+            <a:xfrm>
+              <a:off x="341840" y="1378480"/>
+              <a:ext cx="5291667" cy="4021666"/>
+            </a:xfrm>
+            <a:prstGeom prst="rect">
+              <a:avLst/>
+            </a:prstGeom>
+          </p:spPr>
+        </p:pic>
+        <p:sp>
+          <p:nvSpPr>
+            <p:cNvPr id="12" name="Rectangle 11">
+              <a:extLst>
+                <a:ext uri="{FF2B5EF4-FFF2-40B4-BE49-F238E27FC236}">
+                  <a16:creationId xmlns:a16="http://schemas.microsoft.com/office/drawing/2014/main" id="{FCC081B5-EBC3-1BB4-EDF1-0BE25F14F464}"/>
+                </a:ext>
+              </a:extLst>
+            </p:cNvPr>
+            <p:cNvSpPr/>
+            <p:nvPr/>
+          </p:nvSpPr>
+          <p:spPr>
+            <a:xfrm>
+              <a:off x="341840" y="2195703"/>
+              <a:ext cx="5173135" cy="337947"/>
+            </a:xfrm>
+            <a:prstGeom prst="rect">
+              <a:avLst/>
+            </a:prstGeom>
+            <a:noFill/>
+            <a:ln w="38100">
+              <a:solidFill>
+                <a:schemeClr val="accent6"/>
+              </a:solidFill>
+            </a:ln>
+          </p:spPr>
+          <p:style>
+            <a:lnRef idx="2">
+              <a:schemeClr val="accent1">
+                <a:shade val="15000"/>
+              </a:schemeClr>
+            </a:lnRef>
+            <a:fillRef idx="1">
+              <a:schemeClr val="accent1"/>
+            </a:fillRef>
+            <a:effectRef idx="0">
+              <a:schemeClr val="accent1"/>
+            </a:effectRef>
+            <a:fontRef idx="minor">
+              <a:schemeClr val="lt1"/>
+            </a:fontRef>
+          </p:style>
+          <p:txBody>
+            <a:bodyPr rtlCol="0" anchor="ctr"/>
+            <a:lstStyle/>
+            <a:p>
+              <a:pPr algn="ctr"/>
+              <a:endParaRPr lang="en-US"/>
+            </a:p>
+          </p:txBody>
+        </p:sp>
+        <p:sp>
+          <p:nvSpPr>
+            <p:cNvPr id="13" name="Rectangle 12">
+              <a:extLst>
+                <a:ext uri="{FF2B5EF4-FFF2-40B4-BE49-F238E27FC236}">
+                  <a16:creationId xmlns:a16="http://schemas.microsoft.com/office/drawing/2014/main" id="{D41D4802-7167-9E33-9476-3FFD1254BA2D}"/>
+                </a:ext>
+              </a:extLst>
+            </p:cNvPr>
+            <p:cNvSpPr/>
+            <p:nvPr/>
+          </p:nvSpPr>
+          <p:spPr>
+            <a:xfrm>
+              <a:off x="7239001" y="2443353"/>
+              <a:ext cx="2990850" cy="223647"/>
+            </a:xfrm>
+            <a:prstGeom prst="rect">
+              <a:avLst/>
+            </a:prstGeom>
+            <a:noFill/>
+            <a:ln w="38100">
+              <a:solidFill>
+                <a:schemeClr val="accent6"/>
+              </a:solidFill>
+            </a:ln>
+          </p:spPr>
+          <p:style>
+            <a:lnRef idx="2">
+              <a:schemeClr val="accent1">
+                <a:shade val="15000"/>
+              </a:schemeClr>
+            </a:lnRef>
+            <a:fillRef idx="1">
+              <a:schemeClr val="accent1"/>
+            </a:fillRef>
+            <a:effectRef idx="0">
+              <a:schemeClr val="accent1"/>
+            </a:effectRef>
+            <a:fontRef idx="minor">
+              <a:schemeClr val="lt1"/>
+            </a:fontRef>
+          </p:style>
+          <p:txBody>
+            <a:bodyPr rtlCol="0" anchor="ctr"/>
+            <a:lstStyle/>
+            <a:p>
+              <a:pPr algn="ctr"/>
+              <a:endParaRPr lang="en-US"/>
+            </a:p>
+          </p:txBody>
+        </p:sp>
+        <p:cxnSp>
+          <p:nvCxnSpPr>
+            <p:cNvPr id="14" name="Straight Arrow Connector 13">
+              <a:extLst>
+                <a:ext uri="{FF2B5EF4-FFF2-40B4-BE49-F238E27FC236}">
+                  <a16:creationId xmlns:a16="http://schemas.microsoft.com/office/drawing/2014/main" id="{2D89E1F7-4F77-F02D-C9AE-9F1967881227}"/>
+                </a:ext>
+              </a:extLst>
+            </p:cNvPr>
+            <p:cNvCxnSpPr>
+              <a:cxnSpLocks/>
+            </p:cNvCxnSpPr>
+            <p:nvPr/>
+          </p:nvCxnSpPr>
+          <p:spPr>
+            <a:xfrm flipH="1">
+              <a:off x="10322814" y="2552700"/>
+              <a:ext cx="314325" cy="0"/>
+            </a:xfrm>
+            <a:prstGeom prst="straightConnector1">
+              <a:avLst/>
+            </a:prstGeom>
+            <a:ln w="38100">
+              <a:solidFill>
+                <a:schemeClr val="accent6"/>
+              </a:solidFill>
+              <a:tailEnd type="triangle"/>
+            </a:ln>
+          </p:spPr>
+          <p:style>
+            <a:lnRef idx="2">
+              <a:schemeClr val="accent1"/>
+            </a:lnRef>
+            <a:fillRef idx="0">
+              <a:schemeClr val="accent1"/>
+            </a:fillRef>
+            <a:effectRef idx="1">
+              <a:schemeClr val="accent1"/>
+            </a:effectRef>
+            <a:fontRef idx="minor">
+              <a:schemeClr val="tx1"/>
+            </a:fontRef>
+          </p:style>
+        </p:cxnSp>
+        <p:sp>
+          <p:nvSpPr>
+            <p:cNvPr id="18" name="Rectangle 17">
+              <a:extLst>
+                <a:ext uri="{FF2B5EF4-FFF2-40B4-BE49-F238E27FC236}">
+                  <a16:creationId xmlns:a16="http://schemas.microsoft.com/office/drawing/2014/main" id="{7C4FFEC6-19A0-BA2F-5335-932172ACAE35}"/>
+                </a:ext>
+              </a:extLst>
+            </p:cNvPr>
+            <p:cNvSpPr/>
+            <p:nvPr/>
+          </p:nvSpPr>
+          <p:spPr>
+            <a:xfrm>
+              <a:off x="9326879" y="5082922"/>
+              <a:ext cx="902971" cy="223646"/>
+            </a:xfrm>
+            <a:prstGeom prst="rect">
+              <a:avLst/>
+            </a:prstGeom>
+            <a:noFill/>
+            <a:ln w="38100">
+              <a:solidFill>
+                <a:schemeClr val="accent6"/>
+              </a:solidFill>
+            </a:ln>
+          </p:spPr>
+          <p:style>
+            <a:lnRef idx="2">
+              <a:schemeClr val="accent1">
+                <a:shade val="15000"/>
+              </a:schemeClr>
+            </a:lnRef>
+            <a:fillRef idx="1">
+              <a:schemeClr val="accent1"/>
+            </a:fillRef>
+            <a:effectRef idx="0">
+              <a:schemeClr val="accent1"/>
+            </a:effectRef>
+            <a:fontRef idx="minor">
+              <a:schemeClr val="lt1"/>
+            </a:fontRef>
+          </p:style>
+          <p:txBody>
+            <a:bodyPr rtlCol="0" anchor="ctr"/>
+            <a:lstStyle/>
+            <a:p>
+              <a:pPr algn="ctr"/>
+              <a:endParaRPr lang="en-US"/>
+            </a:p>
+          </p:txBody>
+        </p:sp>
+        <p:cxnSp>
+          <p:nvCxnSpPr>
+            <p:cNvPr id="20" name="Straight Arrow Connector 19">
+              <a:extLst>
+                <a:ext uri="{FF2B5EF4-FFF2-40B4-BE49-F238E27FC236}">
+                  <a16:creationId xmlns:a16="http://schemas.microsoft.com/office/drawing/2014/main" id="{DCC7DBF9-FBB5-B83B-31E7-D3DB437DBF89}"/>
+                </a:ext>
+              </a:extLst>
+            </p:cNvPr>
+            <p:cNvCxnSpPr>
+              <a:cxnSpLocks/>
+            </p:cNvCxnSpPr>
+            <p:nvPr/>
+          </p:nvCxnSpPr>
+          <p:spPr>
+            <a:xfrm>
+              <a:off x="9729216" y="4700016"/>
+              <a:ext cx="0" cy="292608"/>
+            </a:xfrm>
+            <a:prstGeom prst="straightConnector1">
+              <a:avLst/>
+            </a:prstGeom>
+            <a:ln w="38100">
+              <a:solidFill>
+                <a:schemeClr val="accent6"/>
+              </a:solidFill>
+              <a:tailEnd type="triangle"/>
+            </a:ln>
+          </p:spPr>
+          <p:style>
+            <a:lnRef idx="2">
+              <a:schemeClr val="accent1"/>
+            </a:lnRef>
+            <a:fillRef idx="0">
+              <a:schemeClr val="accent1"/>
+            </a:fillRef>
+            <a:effectRef idx="1">
+              <a:schemeClr val="accent1"/>
+            </a:effectRef>
+            <a:fontRef idx="minor">
+              <a:schemeClr val="tx1"/>
+            </a:fontRef>
+          </p:style>
+        </p:cxnSp>
+      </p:grpSp>
+    </p:spTree>
+    <p:extLst>
+      <p:ext uri="{BB962C8B-B14F-4D97-AF65-F5344CB8AC3E}">
+        <p14:creationId xmlns:p14="http://schemas.microsoft.com/office/powerpoint/2010/main" val="2347965032"/>
+      </p:ext>
+    </p:extLst>
+  </p:cSld>
+  <p:clrMapOvr>
+    <a:masterClrMapping/>
+  </p:clrMapOvr>
+</p:sld>
+</file>
+
+<file path=ppt/slides/slide12.xml><?xml version="1.0" encoding="utf-8"?>
+<p:sld xmlns:a="http://schemas.openxmlformats.org/drawingml/2006/main" xmlns:r="http://schemas.openxmlformats.org/officeDocument/2006/relationships" xmlns:p="http://schemas.openxmlformats.org/presentationml/2006/main">
+  <p:cSld>
+    <p:spTree>
+      <p:nvGrpSpPr>
+        <p:cNvPr id="1" name=""/>
+        <p:cNvGrpSpPr/>
+        <p:nvPr/>
+      </p:nvGrpSpPr>
+      <p:grpSpPr>
+        <a:xfrm>
+          <a:off x="0" y="0"/>
+          <a:ext cx="0" cy="0"/>
+          <a:chOff x="0" y="0"/>
+          <a:chExt cx="0" cy="0"/>
+        </a:xfrm>
+      </p:grpSpPr>
+      <p:grpSp>
+        <p:nvGrpSpPr>
+          <p:cNvPr id="2" name="Group 1">
+            <a:extLst>
+              <a:ext uri="{FF2B5EF4-FFF2-40B4-BE49-F238E27FC236}">
+                <a16:creationId xmlns:a16="http://schemas.microsoft.com/office/drawing/2014/main" id="{BFFC2C58-0679-E1B7-AD6C-993BFB107778}"/>
+              </a:ext>
+            </a:extLst>
+          </p:cNvPr>
+          <p:cNvGrpSpPr/>
+          <p:nvPr/>
+        </p:nvGrpSpPr>
+        <p:grpSpPr>
+          <a:xfrm>
+            <a:off x="0" y="174828"/>
+            <a:ext cx="12192000" cy="6508344"/>
+            <a:chOff x="0" y="174828"/>
+            <a:chExt cx="12192000" cy="6508344"/>
+          </a:xfrm>
+        </p:grpSpPr>
+        <p:pic>
+          <p:nvPicPr>
+            <p:cNvPr id="5" name="Picture 4" descr="A screenshot of a computer&#10;&#10;Description automatically generated">
+              <a:extLst>
+                <a:ext uri="{FF2B5EF4-FFF2-40B4-BE49-F238E27FC236}">
+                  <a16:creationId xmlns:a16="http://schemas.microsoft.com/office/drawing/2014/main" id="{DF09A3FA-A768-7FBC-89C0-B62B8BD55EE5}"/>
+                </a:ext>
+              </a:extLst>
+            </p:cNvPr>
+            <p:cNvPicPr>
+              <a:picLocks noChangeAspect="1"/>
+            </p:cNvPicPr>
+            <p:nvPr/>
+          </p:nvPicPr>
+          <p:blipFill>
+            <a:blip r:embed="rId2">
+              <a:extLst>
+                <a:ext uri="{28A0092B-C50C-407E-A947-70E740481C1C}">
+                  <a14:useLocalDpi xmlns:a14="http://schemas.microsoft.com/office/drawing/2010/main" val="0"/>
+                </a:ext>
+              </a:extLst>
+            </a:blip>
+            <a:stretch>
+              <a:fillRect/>
+            </a:stretch>
+          </p:blipFill>
+          <p:spPr>
+            <a:xfrm>
+              <a:off x="0" y="174828"/>
+              <a:ext cx="12192000" cy="6508344"/>
+            </a:xfrm>
+            <a:prstGeom prst="rect">
+              <a:avLst/>
+            </a:prstGeom>
+          </p:spPr>
+        </p:pic>
+        <p:sp>
+          <p:nvSpPr>
+            <p:cNvPr id="6" name="Rectangle 5">
+              <a:extLst>
+                <a:ext uri="{FF2B5EF4-FFF2-40B4-BE49-F238E27FC236}">
+                  <a16:creationId xmlns:a16="http://schemas.microsoft.com/office/drawing/2014/main" id="{1D4141D3-FF59-7FF1-D417-554CEF978BBD}"/>
+                </a:ext>
+              </a:extLst>
+            </p:cNvPr>
+            <p:cNvSpPr/>
+            <p:nvPr/>
+          </p:nvSpPr>
+          <p:spPr>
+            <a:xfrm>
+              <a:off x="6675120" y="3905631"/>
+              <a:ext cx="5402580" cy="457200"/>
+            </a:xfrm>
+            <a:prstGeom prst="rect">
+              <a:avLst/>
+            </a:prstGeom>
+            <a:noFill/>
+            <a:ln w="38100">
+              <a:solidFill>
+                <a:schemeClr val="accent6"/>
+              </a:solidFill>
+            </a:ln>
+          </p:spPr>
+          <p:style>
+            <a:lnRef idx="2">
+              <a:schemeClr val="accent1">
+                <a:shade val="15000"/>
+              </a:schemeClr>
+            </a:lnRef>
+            <a:fillRef idx="1">
+              <a:schemeClr val="accent1"/>
+            </a:fillRef>
+            <a:effectRef idx="0">
+              <a:schemeClr val="accent1"/>
+            </a:effectRef>
+            <a:fontRef idx="minor">
+              <a:schemeClr val="lt1"/>
+            </a:fontRef>
+          </p:style>
+          <p:txBody>
+            <a:bodyPr rtlCol="0" anchor="ctr"/>
+            <a:lstStyle/>
+            <a:p>
+              <a:pPr algn="ctr"/>
+              <a:endParaRPr lang="en-US"/>
+            </a:p>
+          </p:txBody>
+        </p:sp>
+      </p:grpSp>
+    </p:spTree>
+    <p:extLst>
+      <p:ext uri="{BB962C8B-B14F-4D97-AF65-F5344CB8AC3E}">
+        <p14:creationId xmlns:p14="http://schemas.microsoft.com/office/powerpoint/2010/main" val="4178723939"/>
+      </p:ext>
+    </p:extLst>
+  </p:cSld>
+  <p:clrMapOvr>
+    <a:masterClrMapping/>
+  </p:clrMapOvr>
+</p:sld>
+</file>
+
+<file path=ppt/slides/slide13.xml><?xml version="1.0" encoding="utf-8"?>
+<p:sld xmlns:a="http://schemas.openxmlformats.org/drawingml/2006/main" xmlns:r="http://schemas.openxmlformats.org/officeDocument/2006/relationships" xmlns:p="http://schemas.openxmlformats.org/presentationml/2006/main">
+  <p:cSld>
+    <p:spTree>
+      <p:nvGrpSpPr>
+        <p:cNvPr id="1" name=""/>
+        <p:cNvGrpSpPr/>
+        <p:nvPr/>
+      </p:nvGrpSpPr>
+      <p:grpSpPr>
+        <a:xfrm>
+          <a:off x="0" y="0"/>
+          <a:ext cx="0" cy="0"/>
+          <a:chOff x="0" y="0"/>
+          <a:chExt cx="0" cy="0"/>
+        </a:xfrm>
+      </p:grpSpPr>
+      <p:sp>
+        <p:nvSpPr>
+          <p:cNvPr id="3" name="Content Placeholder 2">
+            <a:extLst>
+              <a:ext uri="{FF2B5EF4-FFF2-40B4-BE49-F238E27FC236}">
+                <a16:creationId xmlns:a16="http://schemas.microsoft.com/office/drawing/2014/main" id="{DBCCC61B-01AE-D0CB-917C-833568242846}"/>
+              </a:ext>
+            </a:extLst>
+          </p:cNvPr>
+          <p:cNvSpPr>
+            <a:spLocks noGrp="1"/>
+          </p:cNvSpPr>
+          <p:nvPr>
+            <p:ph idx="1"/>
+          </p:nvPr>
+        </p:nvSpPr>
+        <p:spPr>
+          <a:xfrm>
+            <a:off x="765050" y="390017"/>
+            <a:ext cx="10515600" cy="6175375"/>
+          </a:xfrm>
+        </p:spPr>
+        <p:txBody>
+          <a:bodyPr>
+            <a:noAutofit/>
+          </a:bodyPr>
+          <a:lstStyle/>
+          <a:p>
+            <a:pPr algn="just"/>
+            <a:r>
+              <a:rPr lang="es-CO" sz="1500" dirty="0"/>
+              <a:t>Use the </a:t>
+            </a:r>
+            <a:r>
+              <a:rPr lang="en-US" sz="1500" dirty="0"/>
+              <a:t>file-tree-generator extension in Visual Studio Code by Shinotatwu-DS to generate a tree from a directory</a:t>
+            </a:r>
+          </a:p>
+          <a:p>
+            <a:pPr marL="457200" lvl="1" indent="0">
+              <a:buNone/>
+            </a:pPr>
+            <a:r>
+              <a:rPr lang="en-US" sz="1500" dirty="0"/>
+              <a:t>```</a:t>
+            </a:r>
+          </a:p>
+          <a:p>
+            <a:pPr marL="457200" lvl="1" indent="0">
+              <a:buNone/>
+            </a:pPr>
+            <a:r>
+              <a:rPr lang="en-US" sz="1500" dirty="0"/>
+              <a:t>📦estadistica_descritiva</a:t>
+            </a:r>
+          </a:p>
+          <a:p>
+            <a:pPr marL="457200" lvl="1" indent="0">
+              <a:buNone/>
+            </a:pPr>
+            <a:r>
+              <a:rPr lang="en-US" sz="1500" dirty="0"/>
+              <a:t> ┣ 📂000_scripts</a:t>
+            </a:r>
+          </a:p>
+          <a:p>
+            <a:pPr marL="457200" lvl="1" indent="0">
+              <a:buNone/>
+            </a:pPr>
+            <a:r>
+              <a:rPr lang="en-US" sz="1500" dirty="0"/>
+              <a:t> ┃ ┗ 📜jogar_moeda.R</a:t>
+            </a:r>
+          </a:p>
+          <a:p>
+            <a:pPr marL="457200" lvl="1" indent="0">
+              <a:buNone/>
+            </a:pPr>
+            <a:r>
+              <a:rPr lang="en-US" sz="1500" dirty="0"/>
+              <a:t> ┗ 📜estadistica_descritiva.Rproj</a:t>
+            </a:r>
+          </a:p>
+          <a:p>
+            <a:pPr marL="457200" lvl="1" indent="0">
+              <a:buNone/>
+            </a:pPr>
+            <a:r>
+              <a:rPr lang="en-US" sz="1500" dirty="0"/>
+              <a:t>```</a:t>
+            </a:r>
+          </a:p>
+          <a:p>
+            <a:pPr algn="just"/>
+            <a:r>
+              <a:rPr lang="es-CO" sz="1500" dirty="0"/>
+              <a:t>Modify it so | and - can be visualize in pdf</a:t>
+            </a:r>
+          </a:p>
+          <a:p>
+            <a:pPr marL="457200" lvl="1" indent="0">
+              <a:buNone/>
+            </a:pPr>
+            <a:r>
+              <a:rPr lang="en-US" sz="1500" dirty="0"/>
+              <a:t>```</a:t>
+            </a:r>
+          </a:p>
+          <a:p>
+            <a:pPr marL="457200" lvl="1" indent="0">
+              <a:buNone/>
+            </a:pPr>
+            <a:r>
+              <a:rPr lang="en-US" sz="1500" dirty="0"/>
+              <a:t>📦estadistica_descritiva  </a:t>
+            </a:r>
+          </a:p>
+          <a:p>
+            <a:pPr marL="457200" lvl="1" indent="0">
+              <a:buNone/>
+            </a:pPr>
+            <a:r>
+              <a:rPr lang="en-US" sz="1500" dirty="0"/>
+              <a:t>	|-📂000_scripts </a:t>
+            </a:r>
+          </a:p>
+          <a:p>
+            <a:pPr marL="457200" lvl="1" indent="0">
+              <a:buNone/>
+            </a:pPr>
+            <a:r>
+              <a:rPr lang="en-US" sz="1500" dirty="0"/>
+              <a:t> 	|         |-📜jogar_moeda.R </a:t>
+            </a:r>
+          </a:p>
+          <a:p>
+            <a:pPr marL="457200" lvl="1" indent="0">
+              <a:buNone/>
+            </a:pPr>
+            <a:r>
+              <a:rPr lang="en-US" sz="1500" dirty="0"/>
+              <a:t>	|-📜estadistica_descritiva.Rproj</a:t>
+            </a:r>
+          </a:p>
+          <a:p>
+            <a:pPr marL="457200" lvl="1" indent="0">
+              <a:buNone/>
+            </a:pPr>
+            <a:r>
+              <a:rPr lang="en-US" sz="1500" dirty="0"/>
+              <a:t>```</a:t>
+            </a:r>
+            <a:endParaRPr lang="es-CO" sz="1500" dirty="0"/>
+          </a:p>
+          <a:p>
+            <a:pPr algn="just"/>
+            <a:r>
+              <a:rPr lang="en-US" sz="1500" dirty="0"/>
+              <a:t>UTF-8 icons (https://emojipedia.org)</a:t>
+            </a:r>
+          </a:p>
+          <a:p>
+            <a:pPr marL="457200" lvl="1" indent="0">
+              <a:buNone/>
+            </a:pPr>
+            <a:endParaRPr lang="en-US" sz="1500" dirty="0"/>
+          </a:p>
+          <a:p>
+            <a:pPr lvl="1"/>
+            <a:r>
+              <a:rPr lang="en-US" sz="1600" dirty="0"/>
+              <a:t>Package: U+1F4E6</a:t>
+            </a:r>
+          </a:p>
+          <a:p>
+            <a:pPr lvl="1"/>
+            <a:r>
+              <a:rPr lang="en-US" sz="1600" dirty="0"/>
+              <a:t>Open File Folder: U+1F4C2</a:t>
+            </a:r>
+          </a:p>
+          <a:p>
+            <a:pPr lvl="1"/>
+            <a:r>
+              <a:rPr lang="en-US" sz="1600" dirty="0"/>
+              <a:t>Scroll: U+1F4DC</a:t>
+            </a:r>
+          </a:p>
+          <a:p>
+            <a:pPr lvl="1"/>
+            <a:endParaRPr lang="en-US" sz="2000" dirty="0"/>
+          </a:p>
+          <a:p>
+            <a:pPr marL="457200" lvl="1" indent="0">
+              <a:buNone/>
+            </a:pPr>
+            <a:endParaRPr lang="en-US" sz="2000" dirty="0"/>
+          </a:p>
+        </p:txBody>
+      </p:sp>
+    </p:spTree>
+    <p:extLst>
+      <p:ext uri="{BB962C8B-B14F-4D97-AF65-F5344CB8AC3E}">
+        <p14:creationId xmlns:p14="http://schemas.microsoft.com/office/powerpoint/2010/main" val="4290560833"/>
+      </p:ext>
+    </p:extLst>
+  </p:cSld>
+  <p:clrMapOvr>
+    <a:masterClrMapping/>
+  </p:clrMapOvr>
+</p:sld>
+</file>
+
+<file path=ppt/slides/slide14.xml><?xml version="1.0" encoding="utf-8"?>
+<p:sld xmlns:a="http://schemas.openxmlformats.org/drawingml/2006/main" xmlns:r="http://schemas.openxmlformats.org/officeDocument/2006/relationships" xmlns:p="http://schemas.openxmlformats.org/presentationml/2006/main">
+  <p:cSld>
+    <p:spTree>
+      <p:nvGrpSpPr>
+        <p:cNvPr id="1" name=""/>
+        <p:cNvGrpSpPr/>
+        <p:nvPr/>
+      </p:nvGrpSpPr>
+      <p:grpSpPr>
+        <a:xfrm>
+          <a:off x="0" y="0"/>
+          <a:ext cx="0" cy="0"/>
+          <a:chOff x="0" y="0"/>
+          <a:chExt cx="0" cy="0"/>
+        </a:xfrm>
+      </p:grpSpPr>
+      <p:grpSp>
+        <p:nvGrpSpPr>
+          <p:cNvPr id="18" name="Group 17">
+            <a:extLst>
+              <a:ext uri="{FF2B5EF4-FFF2-40B4-BE49-F238E27FC236}">
+                <a16:creationId xmlns:a16="http://schemas.microsoft.com/office/drawing/2014/main" id="{DDA6DF29-CB39-749C-13F4-00A15AC14D95}"/>
+              </a:ext>
+            </a:extLst>
+          </p:cNvPr>
+          <p:cNvGrpSpPr/>
+          <p:nvPr/>
+        </p:nvGrpSpPr>
+        <p:grpSpPr>
+          <a:xfrm>
+            <a:off x="0" y="168868"/>
+            <a:ext cx="12192000" cy="6520264"/>
+            <a:chOff x="0" y="168868"/>
+            <a:chExt cx="12192000" cy="6520264"/>
+          </a:xfrm>
+        </p:grpSpPr>
+        <p:pic>
+          <p:nvPicPr>
+            <p:cNvPr id="17" name="Picture 16" descr="A screenshot of a computer program&#10;&#10;Description automatically generated">
+              <a:extLst>
+                <a:ext uri="{FF2B5EF4-FFF2-40B4-BE49-F238E27FC236}">
+                  <a16:creationId xmlns:a16="http://schemas.microsoft.com/office/drawing/2014/main" id="{527C6545-A7CC-CF99-F150-18153B76C820}"/>
+                </a:ext>
+              </a:extLst>
+            </p:cNvPr>
+            <p:cNvPicPr>
+              <a:picLocks noChangeAspect="1"/>
+            </p:cNvPicPr>
+            <p:nvPr/>
+          </p:nvPicPr>
+          <p:blipFill>
+            <a:blip r:embed="rId2">
+              <a:extLst>
+                <a:ext uri="{28A0092B-C50C-407E-A947-70E740481C1C}">
+                  <a14:useLocalDpi xmlns:a14="http://schemas.microsoft.com/office/drawing/2010/main" val="0"/>
+                </a:ext>
+              </a:extLst>
+            </a:blip>
+            <a:stretch>
+              <a:fillRect/>
+            </a:stretch>
+          </p:blipFill>
+          <p:spPr>
+            <a:xfrm>
+              <a:off x="0" y="168868"/>
+              <a:ext cx="12192000" cy="6520264"/>
+            </a:xfrm>
+            <a:prstGeom prst="rect">
+              <a:avLst/>
+            </a:prstGeom>
+          </p:spPr>
+        </p:pic>
+        <p:sp>
+          <p:nvSpPr>
+            <p:cNvPr id="6" name="Rectangle 5">
+              <a:extLst>
+                <a:ext uri="{FF2B5EF4-FFF2-40B4-BE49-F238E27FC236}">
+                  <a16:creationId xmlns:a16="http://schemas.microsoft.com/office/drawing/2014/main" id="{A685616A-ABA5-183A-62F5-37E8A81AA4DD}"/>
+                </a:ext>
+              </a:extLst>
+            </p:cNvPr>
+            <p:cNvSpPr/>
+            <p:nvPr/>
+          </p:nvSpPr>
+          <p:spPr>
+            <a:xfrm>
+              <a:off x="531495" y="1238630"/>
+              <a:ext cx="3726180" cy="1352169"/>
+            </a:xfrm>
+            <a:prstGeom prst="rect">
+              <a:avLst/>
+            </a:prstGeom>
+            <a:noFill/>
+            <a:ln w="38100">
+              <a:solidFill>
+                <a:schemeClr val="accent6"/>
+              </a:solidFill>
+            </a:ln>
+          </p:spPr>
+          <p:style>
+            <a:lnRef idx="2">
+              <a:schemeClr val="accent1">
+                <a:shade val="15000"/>
+              </a:schemeClr>
+            </a:lnRef>
+            <a:fillRef idx="1">
+              <a:schemeClr val="accent1"/>
+            </a:fillRef>
+            <a:effectRef idx="0">
+              <a:schemeClr val="accent1"/>
+            </a:effectRef>
+            <a:fontRef idx="minor">
+              <a:schemeClr val="lt1"/>
+            </a:fontRef>
+          </p:style>
+          <p:txBody>
+            <a:bodyPr rtlCol="0" anchor="ctr"/>
+            <a:lstStyle/>
+            <a:p>
+              <a:pPr algn="ctr"/>
+              <a:endParaRPr lang="en-US"/>
+            </a:p>
+          </p:txBody>
+        </p:sp>
+        <p:cxnSp>
+          <p:nvCxnSpPr>
+            <p:cNvPr id="7" name="Straight Arrow Connector 6">
+              <a:extLst>
+                <a:ext uri="{FF2B5EF4-FFF2-40B4-BE49-F238E27FC236}">
+                  <a16:creationId xmlns:a16="http://schemas.microsoft.com/office/drawing/2014/main" id="{9BD6B891-37D1-CE1D-2DA4-6695FB006732}"/>
+                </a:ext>
+              </a:extLst>
+            </p:cNvPr>
+            <p:cNvCxnSpPr>
+              <a:cxnSpLocks/>
+            </p:cNvCxnSpPr>
+            <p:nvPr/>
+          </p:nvCxnSpPr>
+          <p:spPr>
+            <a:xfrm flipH="1">
+              <a:off x="4331589" y="1930527"/>
+              <a:ext cx="314325" cy="0"/>
+            </a:xfrm>
+            <a:prstGeom prst="straightConnector1">
+              <a:avLst/>
+            </a:prstGeom>
+            <a:ln w="38100">
+              <a:solidFill>
+                <a:schemeClr val="accent6"/>
+              </a:solidFill>
+              <a:tailEnd type="triangle"/>
+            </a:ln>
+          </p:spPr>
+          <p:style>
+            <a:lnRef idx="2">
+              <a:schemeClr val="accent1"/>
+            </a:lnRef>
+            <a:fillRef idx="0">
+              <a:schemeClr val="accent1"/>
+            </a:fillRef>
+            <a:effectRef idx="1">
+              <a:schemeClr val="accent1"/>
+            </a:effectRef>
+            <a:fontRef idx="minor">
+              <a:schemeClr val="tx1"/>
+            </a:fontRef>
+          </p:style>
+        </p:cxnSp>
+        <p:sp>
+          <p:nvSpPr>
+            <p:cNvPr id="9" name="Rectangle 8">
+              <a:extLst>
+                <a:ext uri="{FF2B5EF4-FFF2-40B4-BE49-F238E27FC236}">
+                  <a16:creationId xmlns:a16="http://schemas.microsoft.com/office/drawing/2014/main" id="{AE6D4133-2FC6-D1AE-3E67-EECCFD5BBC2B}"/>
+                </a:ext>
+              </a:extLst>
+            </p:cNvPr>
+            <p:cNvSpPr/>
+            <p:nvPr/>
+          </p:nvSpPr>
+          <p:spPr>
+            <a:xfrm>
+              <a:off x="6273165" y="1032128"/>
+              <a:ext cx="327660" cy="187452"/>
+            </a:xfrm>
+            <a:prstGeom prst="rect">
+              <a:avLst/>
+            </a:prstGeom>
+            <a:noFill/>
+            <a:ln w="38100">
+              <a:solidFill>
+                <a:schemeClr val="accent6"/>
+              </a:solidFill>
+            </a:ln>
+          </p:spPr>
+          <p:style>
+            <a:lnRef idx="2">
+              <a:schemeClr val="accent1">
+                <a:shade val="15000"/>
+              </a:schemeClr>
+            </a:lnRef>
+            <a:fillRef idx="1">
+              <a:schemeClr val="accent1"/>
+            </a:fillRef>
+            <a:effectRef idx="0">
+              <a:schemeClr val="accent1"/>
+            </a:effectRef>
+            <a:fontRef idx="minor">
+              <a:schemeClr val="lt1"/>
+            </a:fontRef>
+          </p:style>
+          <p:txBody>
+            <a:bodyPr rtlCol="0" anchor="ctr"/>
+            <a:lstStyle/>
+            <a:p>
+              <a:pPr algn="ctr"/>
+              <a:endParaRPr lang="en-US"/>
+            </a:p>
+          </p:txBody>
+        </p:sp>
+        <p:cxnSp>
+          <p:nvCxnSpPr>
+            <p:cNvPr id="10" name="Straight Arrow Connector 9">
+              <a:extLst>
+                <a:ext uri="{FF2B5EF4-FFF2-40B4-BE49-F238E27FC236}">
+                  <a16:creationId xmlns:a16="http://schemas.microsoft.com/office/drawing/2014/main" id="{07843FEC-1A38-A4B6-1397-2BEA74B3359E}"/>
+                </a:ext>
+              </a:extLst>
+            </p:cNvPr>
+            <p:cNvCxnSpPr>
+              <a:cxnSpLocks/>
+            </p:cNvCxnSpPr>
+            <p:nvPr/>
+          </p:nvCxnSpPr>
+          <p:spPr>
+            <a:xfrm>
+              <a:off x="6431450" y="685757"/>
+              <a:ext cx="0" cy="292608"/>
+            </a:xfrm>
+            <a:prstGeom prst="straightConnector1">
+              <a:avLst/>
+            </a:prstGeom>
+            <a:ln w="38100">
+              <a:solidFill>
+                <a:schemeClr val="accent6"/>
+              </a:solidFill>
+              <a:tailEnd type="triangle"/>
+            </a:ln>
+          </p:spPr>
+          <p:style>
+            <a:lnRef idx="2">
+              <a:schemeClr val="accent1"/>
+            </a:lnRef>
+            <a:fillRef idx="0">
+              <a:schemeClr val="accent1"/>
+            </a:fillRef>
+            <a:effectRef idx="1">
+              <a:schemeClr val="accent1"/>
+            </a:effectRef>
+            <a:fontRef idx="minor">
+              <a:schemeClr val="tx1"/>
+            </a:fontRef>
+          </p:style>
+        </p:cxnSp>
+      </p:grpSp>
+    </p:spTree>
+    <p:extLst>
+      <p:ext uri="{BB962C8B-B14F-4D97-AF65-F5344CB8AC3E}">
+        <p14:creationId xmlns:p14="http://schemas.microsoft.com/office/powerpoint/2010/main" val="2803301930"/>
+      </p:ext>
+    </p:extLst>
+  </p:cSld>
+  <p:clrMapOvr>
+    <a:masterClrMapping/>
+  </p:clrMapOvr>
+</p:sld>
+</file>
+
 <file path=ppt/slides/slide2.xml><?xml version="1.0" encoding="utf-8"?>
 <p:sld xmlns:a="http://schemas.openxmlformats.org/drawingml/2006/main" xmlns:r="http://schemas.openxmlformats.org/officeDocument/2006/relationships" xmlns:p="http://schemas.openxmlformats.org/presentationml/2006/main">
   <p:cSld>
@@ -5358,14 +6531,6 @@
 <file path=ppt/slides/slide6.xml><?xml version="1.0" encoding="utf-8"?>
 <p:sld xmlns:a="http://schemas.openxmlformats.org/drawingml/2006/main" xmlns:r="http://schemas.openxmlformats.org/officeDocument/2006/relationships" xmlns:p="http://schemas.openxmlformats.org/presentationml/2006/main">
   <p:cSld>
-    <p:bg>
-      <p:bgPr>
-        <a:solidFill>
-          <a:schemeClr val="bg1"/>
-        </a:solidFill>
-        <a:effectLst/>
-      </p:bgPr>
-    </p:bg>
     <p:spTree>
       <p:nvGrpSpPr>
         <p:cNvPr id="1" name=""/>
@@ -6283,6 +7448,867 @@
     <p:extLst>
       <p:ext uri="{BB962C8B-B14F-4D97-AF65-F5344CB8AC3E}">
         <p14:creationId xmlns:p14="http://schemas.microsoft.com/office/powerpoint/2010/main" val="1370006056"/>
+      </p:ext>
+    </p:extLst>
+  </p:cSld>
+  <p:clrMapOvr>
+    <a:masterClrMapping/>
+  </p:clrMapOvr>
+</p:sld>
+</file>
+
+<file path=ppt/slides/slide9.xml><?xml version="1.0" encoding="utf-8"?>
+<p:sld xmlns:a="http://schemas.openxmlformats.org/drawingml/2006/main" xmlns:r="http://schemas.openxmlformats.org/officeDocument/2006/relationships" xmlns:p="http://schemas.openxmlformats.org/presentationml/2006/main">
+  <p:cSld>
+    <p:spTree>
+      <p:nvGrpSpPr>
+        <p:cNvPr id="1" name=""/>
+        <p:cNvGrpSpPr/>
+        <p:nvPr/>
+      </p:nvGrpSpPr>
+      <p:grpSpPr>
+        <a:xfrm>
+          <a:off x="0" y="0"/>
+          <a:ext cx="0" cy="0"/>
+          <a:chOff x="0" y="0"/>
+          <a:chExt cx="0" cy="0"/>
+        </a:xfrm>
+      </p:grpSpPr>
+      <p:grpSp>
+        <p:nvGrpSpPr>
+          <p:cNvPr id="39" name="Group 38">
+            <a:extLst>
+              <a:ext uri="{FF2B5EF4-FFF2-40B4-BE49-F238E27FC236}">
+                <a16:creationId xmlns:a16="http://schemas.microsoft.com/office/drawing/2014/main" id="{8989AA44-D68D-EE23-965D-006AE6BBDEAA}"/>
+              </a:ext>
+            </a:extLst>
+          </p:cNvPr>
+          <p:cNvGrpSpPr/>
+          <p:nvPr/>
+        </p:nvGrpSpPr>
+        <p:grpSpPr>
+          <a:xfrm>
+            <a:off x="742950" y="1162117"/>
+            <a:ext cx="10663052" cy="3752783"/>
+            <a:chOff x="742950" y="1162117"/>
+            <a:chExt cx="10663052" cy="3752783"/>
+          </a:xfrm>
+        </p:grpSpPr>
+        <p:pic>
+          <p:nvPicPr>
+            <p:cNvPr id="5" name="Picture 4">
+              <a:extLst>
+                <a:ext uri="{FF2B5EF4-FFF2-40B4-BE49-F238E27FC236}">
+                  <a16:creationId xmlns:a16="http://schemas.microsoft.com/office/drawing/2014/main" id="{7C18239B-8420-EBDA-05F2-713B0DD53222}"/>
+                </a:ext>
+              </a:extLst>
+            </p:cNvPr>
+            <p:cNvPicPr>
+              <a:picLocks noChangeAspect="1"/>
+            </p:cNvPicPr>
+            <p:nvPr/>
+          </p:nvPicPr>
+          <p:blipFill>
+            <a:blip r:embed="rId2">
+              <a:extLst>
+                <a:ext uri="{28A0092B-C50C-407E-A947-70E740481C1C}">
+                  <a14:useLocalDpi xmlns:a14="http://schemas.microsoft.com/office/drawing/2010/main" val="0"/>
+                </a:ext>
+              </a:extLst>
+            </a:blip>
+            <a:stretch>
+              <a:fillRect/>
+            </a:stretch>
+          </p:blipFill>
+          <p:spPr>
+            <a:xfrm>
+              <a:off x="3265018" y="2171700"/>
+              <a:ext cx="5661964" cy="2743200"/>
+            </a:xfrm>
+            <a:prstGeom prst="rect">
+              <a:avLst/>
+            </a:prstGeom>
+            <a:noFill/>
+          </p:spPr>
+        </p:pic>
+        <p:sp>
+          <p:nvSpPr>
+            <p:cNvPr id="6" name="Rectangle: Rounded Corners 5">
+              <a:extLst>
+                <a:ext uri="{FF2B5EF4-FFF2-40B4-BE49-F238E27FC236}">
+                  <a16:creationId xmlns:a16="http://schemas.microsoft.com/office/drawing/2014/main" id="{BB38B725-23E1-F844-CCB8-5770AB3EFC28}"/>
+                </a:ext>
+              </a:extLst>
+            </p:cNvPr>
+            <p:cNvSpPr/>
+            <p:nvPr/>
+          </p:nvSpPr>
+          <p:spPr>
+            <a:xfrm>
+              <a:off x="3387618" y="2190750"/>
+              <a:ext cx="1222481" cy="299308"/>
+            </a:xfrm>
+            <a:prstGeom prst="roundRect">
+              <a:avLst/>
+            </a:prstGeom>
+            <a:solidFill>
+              <a:srgbClr val="1F78B4">
+                <a:alpha val="30000"/>
+              </a:srgbClr>
+            </a:solidFill>
+            <a:ln>
+              <a:noFill/>
+            </a:ln>
+          </p:spPr>
+          <p:style>
+            <a:lnRef idx="2">
+              <a:schemeClr val="accent1">
+                <a:shade val="15000"/>
+              </a:schemeClr>
+            </a:lnRef>
+            <a:fillRef idx="1">
+              <a:schemeClr val="accent1"/>
+            </a:fillRef>
+            <a:effectRef idx="0">
+              <a:schemeClr val="accent1"/>
+            </a:effectRef>
+            <a:fontRef idx="minor">
+              <a:schemeClr val="lt1"/>
+            </a:fontRef>
+          </p:style>
+          <p:txBody>
+            <a:bodyPr rtlCol="0" anchor="ctr"/>
+            <a:lstStyle/>
+            <a:p>
+              <a:pPr algn="ctr"/>
+              <a:endParaRPr lang="en-US" dirty="0"/>
+            </a:p>
+          </p:txBody>
+        </p:sp>
+        <p:cxnSp>
+          <p:nvCxnSpPr>
+            <p:cNvPr id="11" name="Straight Connector 10">
+              <a:extLst>
+                <a:ext uri="{FF2B5EF4-FFF2-40B4-BE49-F238E27FC236}">
+                  <a16:creationId xmlns:a16="http://schemas.microsoft.com/office/drawing/2014/main" id="{3A1218DB-F0CD-ECB9-6535-FD145D82BEC0}"/>
+                </a:ext>
+              </a:extLst>
+            </p:cNvPr>
+            <p:cNvCxnSpPr>
+              <a:cxnSpLocks/>
+              <a:stCxn id="6" idx="1"/>
+            </p:cNvCxnSpPr>
+            <p:nvPr/>
+          </p:nvCxnSpPr>
+          <p:spPr>
+            <a:xfrm flipH="1">
+              <a:off x="3114675" y="2340404"/>
+              <a:ext cx="272943" cy="0"/>
+            </a:xfrm>
+            <a:prstGeom prst="line">
+              <a:avLst/>
+            </a:prstGeom>
+            <a:ln>
+              <a:solidFill>
+                <a:srgbClr val="1F78B4">
+                  <a:alpha val="50000"/>
+                </a:srgbClr>
+              </a:solidFill>
+            </a:ln>
+          </p:spPr>
+          <p:style>
+            <a:lnRef idx="2">
+              <a:schemeClr val="accent1"/>
+            </a:lnRef>
+            <a:fillRef idx="0">
+              <a:schemeClr val="accent1"/>
+            </a:fillRef>
+            <a:effectRef idx="1">
+              <a:schemeClr val="accent1"/>
+            </a:effectRef>
+            <a:fontRef idx="minor">
+              <a:schemeClr val="tx1"/>
+            </a:fontRef>
+          </p:style>
+        </p:cxnSp>
+        <p:sp>
+          <p:nvSpPr>
+            <p:cNvPr id="14" name="TextBox 13">
+              <a:extLst>
+                <a:ext uri="{FF2B5EF4-FFF2-40B4-BE49-F238E27FC236}">
+                  <a16:creationId xmlns:a16="http://schemas.microsoft.com/office/drawing/2014/main" id="{74952127-CF22-04D0-36C5-7C9A40E52ED8}"/>
+                </a:ext>
+              </a:extLst>
+            </p:cNvPr>
+            <p:cNvSpPr txBox="1"/>
+            <p:nvPr/>
+          </p:nvSpPr>
+          <p:spPr>
+            <a:xfrm>
+              <a:off x="813816" y="2171700"/>
+              <a:ext cx="2300859" cy="769441"/>
+            </a:xfrm>
+            <a:prstGeom prst="rect">
+              <a:avLst/>
+            </a:prstGeom>
+            <a:solidFill>
+              <a:srgbClr val="1F78B4">
+                <a:alpha val="30000"/>
+              </a:srgbClr>
+            </a:solidFill>
+          </p:spPr>
+          <p:txBody>
+            <a:bodyPr wrap="square" rtlCol="0">
+              <a:spAutoFit/>
+            </a:bodyPr>
+            <a:lstStyle/>
+            <a:p>
+              <a:pPr algn="just"/>
+              <a:r>
+                <a:rPr lang="en-US" sz="1600" b="1" dirty="0"/>
+                <a:t>Nome: </a:t>
+              </a:r>
+              <a:r>
+                <a:rPr lang="pt-BR" sz="1400" dirty="0">
+                  <a:solidFill>
+                    <a:srgbClr val="333333"/>
+                  </a:solidFill>
+                  <a:latin typeface="Consolas" panose="020B0609020204030204" pitchFamily="49" charset="0"/>
+                </a:rPr>
+                <a:t>Para nomes de funções, procure usar verbos</a:t>
+              </a:r>
+              <a:endParaRPr lang="en-US" sz="1400" dirty="0">
+                <a:solidFill>
+                  <a:srgbClr val="333333"/>
+                </a:solidFill>
+                <a:latin typeface="Consolas" panose="020B0609020204030204" pitchFamily="49" charset="0"/>
+              </a:endParaRPr>
+            </a:p>
+          </p:txBody>
+        </p:sp>
+        <p:sp>
+          <p:nvSpPr>
+            <p:cNvPr id="18" name="Rectangle: Rounded Corners 17">
+              <a:extLst>
+                <a:ext uri="{FF2B5EF4-FFF2-40B4-BE49-F238E27FC236}">
+                  <a16:creationId xmlns:a16="http://schemas.microsoft.com/office/drawing/2014/main" id="{99D14655-FC04-4658-DFDE-D1CF556784D9}"/>
+                </a:ext>
+              </a:extLst>
+            </p:cNvPr>
+            <p:cNvSpPr/>
+            <p:nvPr/>
+          </p:nvSpPr>
+          <p:spPr>
+            <a:xfrm>
+              <a:off x="3521730" y="2941140"/>
+              <a:ext cx="5174214" cy="1786307"/>
+            </a:xfrm>
+            <a:prstGeom prst="roundRect">
+              <a:avLst/>
+            </a:prstGeom>
+            <a:solidFill>
+              <a:srgbClr val="CCBE93">
+                <a:alpha val="29804"/>
+              </a:srgbClr>
+            </a:solidFill>
+            <a:ln>
+              <a:noFill/>
+            </a:ln>
+          </p:spPr>
+          <p:style>
+            <a:lnRef idx="2">
+              <a:schemeClr val="accent1">
+                <a:shade val="15000"/>
+              </a:schemeClr>
+            </a:lnRef>
+            <a:fillRef idx="1">
+              <a:schemeClr val="accent1"/>
+            </a:fillRef>
+            <a:effectRef idx="0">
+              <a:schemeClr val="accent1"/>
+            </a:effectRef>
+            <a:fontRef idx="minor">
+              <a:schemeClr val="lt1"/>
+            </a:fontRef>
+          </p:style>
+          <p:txBody>
+            <a:bodyPr rtlCol="0" anchor="ctr"/>
+            <a:lstStyle/>
+            <a:p>
+              <a:pPr algn="ctr"/>
+              <a:endParaRPr lang="en-US" dirty="0"/>
+            </a:p>
+          </p:txBody>
+        </p:sp>
+        <p:cxnSp>
+          <p:nvCxnSpPr>
+            <p:cNvPr id="19" name="Straight Connector 18">
+              <a:extLst>
+                <a:ext uri="{FF2B5EF4-FFF2-40B4-BE49-F238E27FC236}">
+                  <a16:creationId xmlns:a16="http://schemas.microsoft.com/office/drawing/2014/main" id="{CF457DE9-6125-1C35-634A-9A01596BB200}"/>
+                </a:ext>
+              </a:extLst>
+            </p:cNvPr>
+            <p:cNvCxnSpPr>
+              <a:cxnSpLocks/>
+            </p:cNvCxnSpPr>
+            <p:nvPr/>
+          </p:nvCxnSpPr>
+          <p:spPr>
+            <a:xfrm flipH="1">
+              <a:off x="3114675" y="3826304"/>
+              <a:ext cx="423286" cy="0"/>
+            </a:xfrm>
+            <a:prstGeom prst="line">
+              <a:avLst/>
+            </a:prstGeom>
+            <a:ln>
+              <a:solidFill>
+                <a:srgbClr val="CCBE93">
+                  <a:alpha val="49804"/>
+                </a:srgbClr>
+              </a:solidFill>
+            </a:ln>
+          </p:spPr>
+          <p:style>
+            <a:lnRef idx="2">
+              <a:schemeClr val="accent1"/>
+            </a:lnRef>
+            <a:fillRef idx="0">
+              <a:schemeClr val="accent1"/>
+            </a:fillRef>
+            <a:effectRef idx="1">
+              <a:schemeClr val="accent1"/>
+            </a:effectRef>
+            <a:fontRef idx="minor">
+              <a:schemeClr val="tx1"/>
+            </a:fontRef>
+          </p:style>
+        </p:cxnSp>
+        <p:sp>
+          <p:nvSpPr>
+            <p:cNvPr id="22" name="TextBox 21">
+              <a:extLst>
+                <a:ext uri="{FF2B5EF4-FFF2-40B4-BE49-F238E27FC236}">
+                  <a16:creationId xmlns:a16="http://schemas.microsoft.com/office/drawing/2014/main" id="{D87B63B8-1EAC-E73E-60C8-F4DD99894AC4}"/>
+                </a:ext>
+              </a:extLst>
+            </p:cNvPr>
+            <p:cNvSpPr txBox="1"/>
+            <p:nvPr/>
+          </p:nvSpPr>
+          <p:spPr>
+            <a:xfrm>
+              <a:off x="742950" y="3429000"/>
+              <a:ext cx="2371725" cy="769441"/>
+            </a:xfrm>
+            <a:prstGeom prst="rect">
+              <a:avLst/>
+            </a:prstGeom>
+            <a:solidFill>
+              <a:srgbClr val="CCBE93">
+                <a:alpha val="30000"/>
+              </a:srgbClr>
+            </a:solidFill>
+          </p:spPr>
+          <p:txBody>
+            <a:bodyPr wrap="square" rtlCol="0">
+              <a:spAutoFit/>
+            </a:bodyPr>
+            <a:lstStyle/>
+            <a:p>
+              <a:pPr algn="just"/>
+              <a:r>
+                <a:rPr lang="en-US" sz="1600" b="1" dirty="0"/>
+                <a:t>Corpo: </a:t>
+              </a:r>
+              <a:r>
+                <a:rPr lang="pt-BR" sz="1400" dirty="0">
+                  <a:solidFill>
+                    <a:srgbClr val="333333"/>
+                  </a:solidFill>
+                  <a:latin typeface="Consolas" panose="020B0609020204030204" pitchFamily="49" charset="0"/>
+                </a:rPr>
+                <a:t>Contém o código que será executado ao chamar a função</a:t>
+              </a:r>
+              <a:endParaRPr lang="en-US" sz="1400" dirty="0">
+                <a:solidFill>
+                  <a:srgbClr val="333333"/>
+                </a:solidFill>
+                <a:latin typeface="Consolas" panose="020B0609020204030204" pitchFamily="49" charset="0"/>
+              </a:endParaRPr>
+            </a:p>
+          </p:txBody>
+        </p:sp>
+        <p:sp>
+          <p:nvSpPr>
+            <p:cNvPr id="23" name="Rectangle: Rounded Corners 22">
+              <a:extLst>
+                <a:ext uri="{FF2B5EF4-FFF2-40B4-BE49-F238E27FC236}">
+                  <a16:creationId xmlns:a16="http://schemas.microsoft.com/office/drawing/2014/main" id="{4D670627-FF7D-B811-3822-5106556995C9}"/>
+                </a:ext>
+              </a:extLst>
+            </p:cNvPr>
+            <p:cNvSpPr/>
+            <p:nvPr/>
+          </p:nvSpPr>
+          <p:spPr>
+            <a:xfrm>
+              <a:off x="3619500" y="4343637"/>
+              <a:ext cx="1981200" cy="318358"/>
+            </a:xfrm>
+            <a:prstGeom prst="roundRect">
+              <a:avLst/>
+            </a:prstGeom>
+            <a:solidFill>
+              <a:srgbClr val="E31A1C">
+                <a:alpha val="29804"/>
+              </a:srgbClr>
+            </a:solidFill>
+            <a:ln>
+              <a:noFill/>
+            </a:ln>
+          </p:spPr>
+          <p:style>
+            <a:lnRef idx="2">
+              <a:schemeClr val="accent1">
+                <a:shade val="15000"/>
+              </a:schemeClr>
+            </a:lnRef>
+            <a:fillRef idx="1">
+              <a:schemeClr val="accent1"/>
+            </a:fillRef>
+            <a:effectRef idx="0">
+              <a:schemeClr val="accent1"/>
+            </a:effectRef>
+            <a:fontRef idx="minor">
+              <a:schemeClr val="lt1"/>
+            </a:fontRef>
+          </p:style>
+          <p:txBody>
+            <a:bodyPr rtlCol="0" anchor="ctr"/>
+            <a:lstStyle/>
+            <a:p>
+              <a:pPr algn="ctr"/>
+              <a:endParaRPr lang="en-US" dirty="0"/>
+            </a:p>
+          </p:txBody>
+        </p:sp>
+        <p:cxnSp>
+          <p:nvCxnSpPr>
+            <p:cNvPr id="24" name="Straight Connector 23">
+              <a:extLst>
+                <a:ext uri="{FF2B5EF4-FFF2-40B4-BE49-F238E27FC236}">
+                  <a16:creationId xmlns:a16="http://schemas.microsoft.com/office/drawing/2014/main" id="{4920ECF2-F101-2007-CC56-80BE8E15C13E}"/>
+                </a:ext>
+              </a:extLst>
+            </p:cNvPr>
+            <p:cNvCxnSpPr>
+              <a:cxnSpLocks/>
+            </p:cNvCxnSpPr>
+            <p:nvPr/>
+          </p:nvCxnSpPr>
+          <p:spPr>
+            <a:xfrm flipH="1">
+              <a:off x="5600700" y="4502579"/>
+              <a:ext cx="3429000" cy="0"/>
+            </a:xfrm>
+            <a:prstGeom prst="line">
+              <a:avLst/>
+            </a:prstGeom>
+            <a:ln>
+              <a:solidFill>
+                <a:srgbClr val="E31A1C">
+                  <a:alpha val="49804"/>
+                </a:srgbClr>
+              </a:solidFill>
+            </a:ln>
+          </p:spPr>
+          <p:style>
+            <a:lnRef idx="2">
+              <a:schemeClr val="accent1"/>
+            </a:lnRef>
+            <a:fillRef idx="0">
+              <a:schemeClr val="accent1"/>
+            </a:fillRef>
+            <a:effectRef idx="1">
+              <a:schemeClr val="accent1"/>
+            </a:effectRef>
+            <a:fontRef idx="minor">
+              <a:schemeClr val="tx1"/>
+            </a:fontRef>
+          </p:style>
+        </p:cxnSp>
+        <p:sp>
+          <p:nvSpPr>
+            <p:cNvPr id="26" name="TextBox 25">
+              <a:extLst>
+                <a:ext uri="{FF2B5EF4-FFF2-40B4-BE49-F238E27FC236}">
+                  <a16:creationId xmlns:a16="http://schemas.microsoft.com/office/drawing/2014/main" id="{E1D1E3E6-36FB-3421-181F-A95EEBB7BAA8}"/>
+                </a:ext>
+              </a:extLst>
+            </p:cNvPr>
+            <p:cNvSpPr txBox="1"/>
+            <p:nvPr/>
+          </p:nvSpPr>
+          <p:spPr>
+            <a:xfrm>
+              <a:off x="9034277" y="4232259"/>
+              <a:ext cx="2371725" cy="553998"/>
+            </a:xfrm>
+            <a:prstGeom prst="rect">
+              <a:avLst/>
+            </a:prstGeom>
+            <a:solidFill>
+              <a:srgbClr val="E31A1C">
+                <a:alpha val="29804"/>
+              </a:srgbClr>
+            </a:solidFill>
+          </p:spPr>
+          <p:txBody>
+            <a:bodyPr wrap="square" rtlCol="0">
+              <a:spAutoFit/>
+            </a:bodyPr>
+            <a:lstStyle/>
+            <a:p>
+              <a:pPr algn="just"/>
+              <a:r>
+                <a:rPr lang="en-US" sz="1600" b="1" dirty="0"/>
+                <a:t>Saída da função: </a:t>
+              </a:r>
+              <a:r>
+                <a:rPr lang="pt-BR" sz="1400" dirty="0">
+                  <a:solidFill>
+                    <a:srgbClr val="333333"/>
+                  </a:solidFill>
+                  <a:latin typeface="Consolas" panose="020B0609020204030204" pitchFamily="49" charset="0"/>
+                </a:rPr>
+                <a:t>Objeto que a função gera</a:t>
+              </a:r>
+              <a:endParaRPr lang="en-US" sz="1400" dirty="0">
+                <a:solidFill>
+                  <a:srgbClr val="333333"/>
+                </a:solidFill>
+                <a:latin typeface="Consolas" panose="020B0609020204030204" pitchFamily="49" charset="0"/>
+              </a:endParaRPr>
+            </a:p>
+          </p:txBody>
+        </p:sp>
+        <p:sp>
+          <p:nvSpPr>
+            <p:cNvPr id="27" name="Rectangle: Rounded Corners 26">
+              <a:extLst>
+                <a:ext uri="{FF2B5EF4-FFF2-40B4-BE49-F238E27FC236}">
+                  <a16:creationId xmlns:a16="http://schemas.microsoft.com/office/drawing/2014/main" id="{55DAD945-E2EF-7653-634C-33011032E856}"/>
+                </a:ext>
+              </a:extLst>
+            </p:cNvPr>
+            <p:cNvSpPr/>
+            <p:nvPr/>
+          </p:nvSpPr>
+          <p:spPr>
+            <a:xfrm>
+              <a:off x="5883168" y="2181225"/>
+              <a:ext cx="1355832" cy="299308"/>
+            </a:xfrm>
+            <a:prstGeom prst="roundRect">
+              <a:avLst/>
+            </a:prstGeom>
+            <a:solidFill>
+              <a:srgbClr val="B2DF8A">
+                <a:alpha val="29804"/>
+              </a:srgbClr>
+            </a:solidFill>
+            <a:ln>
+              <a:noFill/>
+            </a:ln>
+          </p:spPr>
+          <p:style>
+            <a:lnRef idx="2">
+              <a:schemeClr val="accent1">
+                <a:shade val="15000"/>
+              </a:schemeClr>
+            </a:lnRef>
+            <a:fillRef idx="1">
+              <a:schemeClr val="accent1"/>
+            </a:fillRef>
+            <a:effectRef idx="0">
+              <a:schemeClr val="accent1"/>
+            </a:effectRef>
+            <a:fontRef idx="minor">
+              <a:schemeClr val="lt1"/>
+            </a:fontRef>
+          </p:style>
+          <p:txBody>
+            <a:bodyPr rtlCol="0" anchor="ctr"/>
+            <a:lstStyle/>
+            <a:p>
+              <a:pPr algn="ctr"/>
+              <a:endParaRPr lang="en-US" dirty="0"/>
+            </a:p>
+          </p:txBody>
+        </p:sp>
+        <p:sp>
+          <p:nvSpPr>
+            <p:cNvPr id="29" name="Rectangle: Rounded Corners 28">
+              <a:extLst>
+                <a:ext uri="{FF2B5EF4-FFF2-40B4-BE49-F238E27FC236}">
+                  <a16:creationId xmlns:a16="http://schemas.microsoft.com/office/drawing/2014/main" id="{FF58FBE7-7FC9-237F-5395-AA0F03B3C4D7}"/>
+                </a:ext>
+              </a:extLst>
+            </p:cNvPr>
+            <p:cNvSpPr/>
+            <p:nvPr/>
+          </p:nvSpPr>
+          <p:spPr>
+            <a:xfrm>
+              <a:off x="6711843" y="2519294"/>
+              <a:ext cx="1851132" cy="222033"/>
+            </a:xfrm>
+            <a:prstGeom prst="roundRect">
+              <a:avLst/>
+            </a:prstGeom>
+            <a:solidFill>
+              <a:srgbClr val="CAB2D6">
+                <a:alpha val="29804"/>
+              </a:srgbClr>
+            </a:solidFill>
+            <a:ln>
+              <a:noFill/>
+            </a:ln>
+          </p:spPr>
+          <p:style>
+            <a:lnRef idx="2">
+              <a:schemeClr val="accent1">
+                <a:shade val="15000"/>
+              </a:schemeClr>
+            </a:lnRef>
+            <a:fillRef idx="1">
+              <a:schemeClr val="accent1"/>
+            </a:fillRef>
+            <a:effectRef idx="0">
+              <a:schemeClr val="accent1"/>
+            </a:effectRef>
+            <a:fontRef idx="minor">
+              <a:schemeClr val="lt1"/>
+            </a:fontRef>
+          </p:style>
+          <p:txBody>
+            <a:bodyPr rtlCol="0" anchor="ctr"/>
+            <a:lstStyle/>
+            <a:p>
+              <a:pPr algn="ctr"/>
+              <a:endParaRPr lang="en-US" dirty="0"/>
+            </a:p>
+          </p:txBody>
+        </p:sp>
+        <p:cxnSp>
+          <p:nvCxnSpPr>
+            <p:cNvPr id="31" name="Straight Connector 30">
+              <a:extLst>
+                <a:ext uri="{FF2B5EF4-FFF2-40B4-BE49-F238E27FC236}">
+                  <a16:creationId xmlns:a16="http://schemas.microsoft.com/office/drawing/2014/main" id="{9D4106BD-4D45-4A81-0B8C-A1471E96E9B1}"/>
+                </a:ext>
+              </a:extLst>
+            </p:cNvPr>
+            <p:cNvCxnSpPr>
+              <a:cxnSpLocks/>
+            </p:cNvCxnSpPr>
+            <p:nvPr/>
+          </p:nvCxnSpPr>
+          <p:spPr>
+            <a:xfrm>
+              <a:off x="6637284" y="1936321"/>
+              <a:ext cx="0" cy="244904"/>
+            </a:xfrm>
+            <a:prstGeom prst="line">
+              <a:avLst/>
+            </a:prstGeom>
+            <a:ln>
+              <a:solidFill>
+                <a:srgbClr val="B2DF8A">
+                  <a:alpha val="50000"/>
+                </a:srgbClr>
+              </a:solidFill>
+            </a:ln>
+          </p:spPr>
+          <p:style>
+            <a:lnRef idx="2">
+              <a:schemeClr val="accent1"/>
+            </a:lnRef>
+            <a:fillRef idx="0">
+              <a:schemeClr val="accent1"/>
+            </a:fillRef>
+            <a:effectRef idx="1">
+              <a:schemeClr val="accent1"/>
+            </a:effectRef>
+            <a:fontRef idx="minor">
+              <a:schemeClr val="tx1"/>
+            </a:fontRef>
+          </p:style>
+        </p:cxnSp>
+        <p:sp>
+          <p:nvSpPr>
+            <p:cNvPr id="33" name="TextBox 32">
+              <a:extLst>
+                <a:ext uri="{FF2B5EF4-FFF2-40B4-BE49-F238E27FC236}">
+                  <a16:creationId xmlns:a16="http://schemas.microsoft.com/office/drawing/2014/main" id="{72069786-0EA0-7732-C454-85021DED00C5}"/>
+                </a:ext>
+              </a:extLst>
+            </p:cNvPr>
+            <p:cNvSpPr txBox="1"/>
+            <p:nvPr/>
+          </p:nvSpPr>
+          <p:spPr>
+            <a:xfrm>
+              <a:off x="4983138" y="1162117"/>
+              <a:ext cx="3308292" cy="769441"/>
+            </a:xfrm>
+            <a:prstGeom prst="rect">
+              <a:avLst/>
+            </a:prstGeom>
+            <a:solidFill>
+              <a:srgbClr val="B2DF8A">
+                <a:alpha val="29804"/>
+              </a:srgbClr>
+            </a:solidFill>
+          </p:spPr>
+          <p:txBody>
+            <a:bodyPr wrap="square" rtlCol="0">
+              <a:spAutoFit/>
+            </a:bodyPr>
+            <a:lstStyle/>
+            <a:p>
+              <a:pPr algn="just"/>
+              <a:r>
+                <a:rPr lang="en-US" sz="1600" b="1" dirty="0"/>
+                <a:t>Argumento: </a:t>
+              </a:r>
+              <a:r>
+                <a:rPr lang="pt-BR" sz="1400" dirty="0">
+                  <a:solidFill>
+                    <a:srgbClr val="333333"/>
+                  </a:solidFill>
+                  <a:latin typeface="Consolas" panose="020B0609020204030204" pitchFamily="49" charset="0"/>
+                </a:rPr>
+                <a:t>Variáveis fornecidas a uma função quando ela é chamada</a:t>
+              </a:r>
+              <a:endParaRPr lang="en-US" sz="1400" dirty="0">
+                <a:solidFill>
+                  <a:srgbClr val="333333"/>
+                </a:solidFill>
+                <a:latin typeface="Consolas" panose="020B0609020204030204" pitchFamily="49" charset="0"/>
+              </a:endParaRPr>
+            </a:p>
+          </p:txBody>
+        </p:sp>
+        <p:cxnSp>
+          <p:nvCxnSpPr>
+            <p:cNvPr id="34" name="Straight Connector 33">
+              <a:extLst>
+                <a:ext uri="{FF2B5EF4-FFF2-40B4-BE49-F238E27FC236}">
+                  <a16:creationId xmlns:a16="http://schemas.microsoft.com/office/drawing/2014/main" id="{27617AD8-DA46-D922-2E57-C87ED67340A7}"/>
+                </a:ext>
+              </a:extLst>
+            </p:cNvPr>
+            <p:cNvCxnSpPr>
+              <a:cxnSpLocks/>
+              <a:stCxn id="36" idx="1"/>
+              <a:endCxn id="29" idx="3"/>
+            </p:cNvCxnSpPr>
+            <p:nvPr/>
+          </p:nvCxnSpPr>
+          <p:spPr>
+            <a:xfrm flipH="1">
+              <a:off x="8562975" y="2625741"/>
+              <a:ext cx="466725" cy="4570"/>
+            </a:xfrm>
+            <a:prstGeom prst="line">
+              <a:avLst/>
+            </a:prstGeom>
+            <a:ln>
+              <a:solidFill>
+                <a:srgbClr val="CAB2D6">
+                  <a:alpha val="49804"/>
+                </a:srgbClr>
+              </a:solidFill>
+            </a:ln>
+          </p:spPr>
+          <p:style>
+            <a:lnRef idx="2">
+              <a:schemeClr val="accent1"/>
+            </a:lnRef>
+            <a:fillRef idx="0">
+              <a:schemeClr val="accent1"/>
+            </a:fillRef>
+            <a:effectRef idx="1">
+              <a:schemeClr val="accent1"/>
+            </a:effectRef>
+            <a:fontRef idx="minor">
+              <a:schemeClr val="tx1"/>
+            </a:fontRef>
+          </p:style>
+        </p:cxnSp>
+        <p:sp>
+          <p:nvSpPr>
+            <p:cNvPr id="36" name="TextBox 35">
+              <a:extLst>
+                <a:ext uri="{FF2B5EF4-FFF2-40B4-BE49-F238E27FC236}">
+                  <a16:creationId xmlns:a16="http://schemas.microsoft.com/office/drawing/2014/main" id="{6B5D5DFD-7243-4DED-B4B8-1EFFAA3D5064}"/>
+                </a:ext>
+              </a:extLst>
+            </p:cNvPr>
+            <p:cNvSpPr txBox="1"/>
+            <p:nvPr/>
+          </p:nvSpPr>
+          <p:spPr>
+            <a:xfrm>
+              <a:off x="9029700" y="2241020"/>
+              <a:ext cx="2371725" cy="769441"/>
+            </a:xfrm>
+            <a:prstGeom prst="rect">
+              <a:avLst/>
+            </a:prstGeom>
+            <a:solidFill>
+              <a:srgbClr val="CAB2D6">
+                <a:alpha val="29804"/>
+              </a:srgbClr>
+            </a:solidFill>
+          </p:spPr>
+          <p:txBody>
+            <a:bodyPr wrap="square" rtlCol="0">
+              <a:spAutoFit/>
+            </a:bodyPr>
+            <a:lstStyle/>
+            <a:p>
+              <a:pPr algn="just"/>
+              <a:r>
+                <a:rPr lang="en-US" sz="1600" b="1" dirty="0"/>
+                <a:t>Valor padrão: </a:t>
+              </a:r>
+              <a:r>
+                <a:rPr lang="pt-BR" sz="1400" dirty="0">
+                  <a:solidFill>
+                    <a:srgbClr val="333333"/>
+                  </a:solidFill>
+                  <a:latin typeface="Consolas" panose="020B0609020204030204" pitchFamily="49" charset="0"/>
+                </a:rPr>
+                <a:t>Valores usados se nenhum for fornecido</a:t>
+              </a:r>
+              <a:endParaRPr lang="en-US" sz="1400" dirty="0">
+                <a:solidFill>
+                  <a:srgbClr val="333333"/>
+                </a:solidFill>
+                <a:latin typeface="Consolas" panose="020B0609020204030204" pitchFamily="49" charset="0"/>
+              </a:endParaRPr>
+            </a:p>
+          </p:txBody>
+        </p:sp>
+      </p:grpSp>
+    </p:spTree>
+    <p:extLst>
+      <p:ext uri="{BB962C8B-B14F-4D97-AF65-F5344CB8AC3E}">
+        <p14:creationId xmlns:p14="http://schemas.microsoft.com/office/powerpoint/2010/main" val="3880257777"/>
       </p:ext>
     </p:extLst>
   </p:cSld>

</xml_diff>

<commit_message>
Finish section packages related to appendix intro to R
</commit_message>
<xml_diff>
--- a/images/000_edit_images.pptx
+++ b/images/000_edit_images.pptx
@@ -19,6 +19,7 @@
     <p:sldId id="268" r:id="rId13"/>
     <p:sldId id="271" r:id="rId14"/>
     <p:sldId id="272" r:id="rId15"/>
+    <p:sldId id="274" r:id="rId16"/>
   </p:sldIdLst>
   <p:sldSz cx="12192000" cy="6858000"/>
   <p:notesSz cx="6858000" cy="9144000"/>
@@ -4709,12 +4710,270 @@
           <a:chExt cx="0" cy="0"/>
         </a:xfrm>
       </p:grpSpPr>
+      <p:pic>
+        <p:nvPicPr>
+          <p:cNvPr id="17" name="Picture 16" descr="A screenshot of a computer program&#10;&#10;Description automatically generated">
+            <a:extLst>
+              <a:ext uri="{FF2B5EF4-FFF2-40B4-BE49-F238E27FC236}">
+                <a16:creationId xmlns:a16="http://schemas.microsoft.com/office/drawing/2014/main" id="{527C6545-A7CC-CF99-F150-18153B76C820}"/>
+              </a:ext>
+            </a:extLst>
+          </p:cNvPr>
+          <p:cNvPicPr>
+            <a:picLocks noChangeAspect="1"/>
+          </p:cNvPicPr>
+          <p:nvPr/>
+        </p:nvPicPr>
+        <p:blipFill>
+          <a:blip r:embed="rId2">
+            <a:extLst>
+              <a:ext uri="{28A0092B-C50C-407E-A947-70E740481C1C}">
+                <a14:useLocalDpi xmlns:a14="http://schemas.microsoft.com/office/drawing/2010/main" val="0"/>
+              </a:ext>
+            </a:extLst>
+          </a:blip>
+          <a:stretch>
+            <a:fillRect/>
+          </a:stretch>
+        </p:blipFill>
+        <p:spPr>
+          <a:xfrm>
+            <a:off x="0" y="168868"/>
+            <a:ext cx="12192000" cy="6520264"/>
+          </a:xfrm>
+          <a:prstGeom prst="rect">
+            <a:avLst/>
+          </a:prstGeom>
+        </p:spPr>
+      </p:pic>
+      <p:sp>
+        <p:nvSpPr>
+          <p:cNvPr id="6" name="Rectangle 5">
+            <a:extLst>
+              <a:ext uri="{FF2B5EF4-FFF2-40B4-BE49-F238E27FC236}">
+                <a16:creationId xmlns:a16="http://schemas.microsoft.com/office/drawing/2014/main" id="{A685616A-ABA5-183A-62F5-37E8A81AA4DD}"/>
+              </a:ext>
+            </a:extLst>
+          </p:cNvPr>
+          <p:cNvSpPr/>
+          <p:nvPr/>
+        </p:nvSpPr>
+        <p:spPr>
+          <a:xfrm>
+            <a:off x="531495" y="1238630"/>
+            <a:ext cx="3726180" cy="1352169"/>
+          </a:xfrm>
+          <a:prstGeom prst="rect">
+            <a:avLst/>
+          </a:prstGeom>
+          <a:noFill/>
+          <a:ln w="38100">
+            <a:solidFill>
+              <a:schemeClr val="accent6"/>
+            </a:solidFill>
+          </a:ln>
+        </p:spPr>
+        <p:style>
+          <a:lnRef idx="2">
+            <a:schemeClr val="accent1">
+              <a:shade val="15000"/>
+            </a:schemeClr>
+          </a:lnRef>
+          <a:fillRef idx="1">
+            <a:schemeClr val="accent1"/>
+          </a:fillRef>
+          <a:effectRef idx="0">
+            <a:schemeClr val="accent1"/>
+          </a:effectRef>
+          <a:fontRef idx="minor">
+            <a:schemeClr val="lt1"/>
+          </a:fontRef>
+        </p:style>
+        <p:txBody>
+          <a:bodyPr rtlCol="0" anchor="ctr"/>
+          <a:lstStyle/>
+          <a:p>
+            <a:pPr algn="ctr"/>
+            <a:endParaRPr lang="en-US"/>
+          </a:p>
+        </p:txBody>
+      </p:sp>
+      <p:cxnSp>
+        <p:nvCxnSpPr>
+          <p:cNvPr id="7" name="Straight Arrow Connector 6">
+            <a:extLst>
+              <a:ext uri="{FF2B5EF4-FFF2-40B4-BE49-F238E27FC236}">
+                <a16:creationId xmlns:a16="http://schemas.microsoft.com/office/drawing/2014/main" id="{9BD6B891-37D1-CE1D-2DA4-6695FB006732}"/>
+              </a:ext>
+            </a:extLst>
+          </p:cNvPr>
+          <p:cNvCxnSpPr>
+            <a:cxnSpLocks/>
+          </p:cNvCxnSpPr>
+          <p:nvPr/>
+        </p:nvCxnSpPr>
+        <p:spPr>
+          <a:xfrm flipH="1">
+            <a:off x="4331589" y="1930527"/>
+            <a:ext cx="314325" cy="0"/>
+          </a:xfrm>
+          <a:prstGeom prst="straightConnector1">
+            <a:avLst/>
+          </a:prstGeom>
+          <a:ln w="38100">
+            <a:solidFill>
+              <a:schemeClr val="accent6"/>
+            </a:solidFill>
+            <a:tailEnd type="triangle"/>
+          </a:ln>
+        </p:spPr>
+        <p:style>
+          <a:lnRef idx="2">
+            <a:schemeClr val="accent1"/>
+          </a:lnRef>
+          <a:fillRef idx="0">
+            <a:schemeClr val="accent1"/>
+          </a:fillRef>
+          <a:effectRef idx="1">
+            <a:schemeClr val="accent1"/>
+          </a:effectRef>
+          <a:fontRef idx="minor">
+            <a:schemeClr val="tx1"/>
+          </a:fontRef>
+        </p:style>
+      </p:cxnSp>
+      <p:sp>
+        <p:nvSpPr>
+          <p:cNvPr id="9" name="Rectangle 8">
+            <a:extLst>
+              <a:ext uri="{FF2B5EF4-FFF2-40B4-BE49-F238E27FC236}">
+                <a16:creationId xmlns:a16="http://schemas.microsoft.com/office/drawing/2014/main" id="{AE6D4133-2FC6-D1AE-3E67-EECCFD5BBC2B}"/>
+              </a:ext>
+            </a:extLst>
+          </p:cNvPr>
+          <p:cNvSpPr/>
+          <p:nvPr/>
+        </p:nvSpPr>
+        <p:spPr>
+          <a:xfrm>
+            <a:off x="6273165" y="1032128"/>
+            <a:ext cx="327660" cy="187452"/>
+          </a:xfrm>
+          <a:prstGeom prst="rect">
+            <a:avLst/>
+          </a:prstGeom>
+          <a:noFill/>
+          <a:ln w="38100">
+            <a:solidFill>
+              <a:schemeClr val="accent6"/>
+            </a:solidFill>
+          </a:ln>
+        </p:spPr>
+        <p:style>
+          <a:lnRef idx="2">
+            <a:schemeClr val="accent1">
+              <a:shade val="15000"/>
+            </a:schemeClr>
+          </a:lnRef>
+          <a:fillRef idx="1">
+            <a:schemeClr val="accent1"/>
+          </a:fillRef>
+          <a:effectRef idx="0">
+            <a:schemeClr val="accent1"/>
+          </a:effectRef>
+          <a:fontRef idx="minor">
+            <a:schemeClr val="lt1"/>
+          </a:fontRef>
+        </p:style>
+        <p:txBody>
+          <a:bodyPr rtlCol="0" anchor="ctr"/>
+          <a:lstStyle/>
+          <a:p>
+            <a:pPr algn="ctr"/>
+            <a:endParaRPr lang="en-US"/>
+          </a:p>
+        </p:txBody>
+      </p:sp>
+      <p:cxnSp>
+        <p:nvCxnSpPr>
+          <p:cNvPr id="10" name="Straight Arrow Connector 9">
+            <a:extLst>
+              <a:ext uri="{FF2B5EF4-FFF2-40B4-BE49-F238E27FC236}">
+                <a16:creationId xmlns:a16="http://schemas.microsoft.com/office/drawing/2014/main" id="{07843FEC-1A38-A4B6-1397-2BEA74B3359E}"/>
+              </a:ext>
+            </a:extLst>
+          </p:cNvPr>
+          <p:cNvCxnSpPr>
+            <a:cxnSpLocks/>
+          </p:cNvCxnSpPr>
+          <p:nvPr/>
+        </p:nvCxnSpPr>
+        <p:spPr>
+          <a:xfrm>
+            <a:off x="6431450" y="685757"/>
+            <a:ext cx="0" cy="292608"/>
+          </a:xfrm>
+          <a:prstGeom prst="straightConnector1">
+            <a:avLst/>
+          </a:prstGeom>
+          <a:ln w="38100">
+            <a:solidFill>
+              <a:schemeClr val="accent6"/>
+            </a:solidFill>
+            <a:tailEnd type="triangle"/>
+          </a:ln>
+        </p:spPr>
+        <p:style>
+          <a:lnRef idx="2">
+            <a:schemeClr val="accent1"/>
+          </a:lnRef>
+          <a:fillRef idx="0">
+            <a:schemeClr val="accent1"/>
+          </a:fillRef>
+          <a:effectRef idx="1">
+            <a:schemeClr val="accent1"/>
+          </a:effectRef>
+          <a:fontRef idx="minor">
+            <a:schemeClr val="tx1"/>
+          </a:fontRef>
+        </p:style>
+      </p:cxnSp>
+    </p:spTree>
+    <p:extLst>
+      <p:ext uri="{BB962C8B-B14F-4D97-AF65-F5344CB8AC3E}">
+        <p14:creationId xmlns:p14="http://schemas.microsoft.com/office/powerpoint/2010/main" val="2803301930"/>
+      </p:ext>
+    </p:extLst>
+  </p:cSld>
+  <p:clrMapOvr>
+    <a:masterClrMapping/>
+  </p:clrMapOvr>
+</p:sld>
+</file>
+
+<file path=ppt/slides/slide15.xml><?xml version="1.0" encoding="utf-8"?>
+<p:sld xmlns:a="http://schemas.openxmlformats.org/drawingml/2006/main" xmlns:r="http://schemas.openxmlformats.org/officeDocument/2006/relationships" xmlns:p="http://schemas.openxmlformats.org/presentationml/2006/main">
+  <p:cSld>
+    <p:spTree>
+      <p:nvGrpSpPr>
+        <p:cNvPr id="1" name=""/>
+        <p:cNvGrpSpPr/>
+        <p:nvPr/>
+      </p:nvGrpSpPr>
+      <p:grpSpPr>
+        <a:xfrm>
+          <a:off x="0" y="0"/>
+          <a:ext cx="0" cy="0"/>
+          <a:chOff x="0" y="0"/>
+          <a:chExt cx="0" cy="0"/>
+        </a:xfrm>
+      </p:grpSpPr>
       <p:grpSp>
         <p:nvGrpSpPr>
-          <p:cNvPr id="18" name="Group 17">
-            <a:extLst>
-              <a:ext uri="{FF2B5EF4-FFF2-40B4-BE49-F238E27FC236}">
-                <a16:creationId xmlns:a16="http://schemas.microsoft.com/office/drawing/2014/main" id="{DDA6DF29-CB39-749C-13F4-00A15AC14D95}"/>
+          <p:cNvPr id="16" name="Group 15">
+            <a:extLst>
+              <a:ext uri="{FF2B5EF4-FFF2-40B4-BE49-F238E27FC236}">
+                <a16:creationId xmlns:a16="http://schemas.microsoft.com/office/drawing/2014/main" id="{F0239FB7-3AF6-1B5B-99F5-494D95E899FE}"/>
               </a:ext>
             </a:extLst>
           </p:cNvPr>
@@ -4723,18 +4982,18 @@
         </p:nvGrpSpPr>
         <p:grpSpPr>
           <a:xfrm>
-            <a:off x="0" y="168868"/>
-            <a:ext cx="12192000" cy="6520264"/>
-            <a:chOff x="0" y="168868"/>
-            <a:chExt cx="12192000" cy="6520264"/>
+            <a:off x="0" y="180278"/>
+            <a:ext cx="12192000" cy="6497444"/>
+            <a:chOff x="0" y="180278"/>
+            <a:chExt cx="12192000" cy="6497444"/>
           </a:xfrm>
         </p:grpSpPr>
         <p:pic>
           <p:nvPicPr>
-            <p:cNvPr id="17" name="Picture 16" descr="A screenshot of a computer program&#10;&#10;Description automatically generated">
+            <p:cNvPr id="10" name="Picture 9" descr="A screenshot of a computer program&#10;&#10;Description automatically generated">
               <a:extLst>
                 <a:ext uri="{FF2B5EF4-FFF2-40B4-BE49-F238E27FC236}">
-                  <a16:creationId xmlns:a16="http://schemas.microsoft.com/office/drawing/2014/main" id="{527C6545-A7CC-CF99-F150-18153B76C820}"/>
+                  <a16:creationId xmlns:a16="http://schemas.microsoft.com/office/drawing/2014/main" id="{E5E568AE-65BA-6EA8-4FF2-2786765A51D1}"/>
                 </a:ext>
               </a:extLst>
             </p:cNvPr>
@@ -4757,8 +5016,8 @@
           </p:blipFill>
           <p:spPr>
             <a:xfrm>
-              <a:off x="0" y="168868"/>
-              <a:ext cx="12192000" cy="6520264"/>
+              <a:off x="0" y="180278"/>
+              <a:ext cx="12192000" cy="6497444"/>
             </a:xfrm>
             <a:prstGeom prst="rect">
               <a:avLst/>
@@ -4767,10 +5026,10 @@
         </p:pic>
         <p:sp>
           <p:nvSpPr>
-            <p:cNvPr id="6" name="Rectangle 5">
+            <p:cNvPr id="2" name="Rectangle 1">
               <a:extLst>
                 <a:ext uri="{FF2B5EF4-FFF2-40B4-BE49-F238E27FC236}">
-                  <a16:creationId xmlns:a16="http://schemas.microsoft.com/office/drawing/2014/main" id="{A685616A-ABA5-183A-62F5-37E8A81AA4DD}"/>
+                  <a16:creationId xmlns:a16="http://schemas.microsoft.com/office/drawing/2014/main" id="{6EAFB75B-A72C-4579-B44B-E0D0DA991F46}"/>
                 </a:ext>
               </a:extLst>
             </p:cNvPr>
@@ -4779,8 +5038,156 @@
           </p:nvSpPr>
           <p:spPr>
             <a:xfrm>
-              <a:off x="531495" y="1238630"/>
-              <a:ext cx="3726180" cy="1352169"/>
+              <a:off x="6667118" y="1631823"/>
+              <a:ext cx="5439537" cy="233554"/>
+            </a:xfrm>
+            <a:prstGeom prst="rect">
+              <a:avLst/>
+            </a:prstGeom>
+            <a:noFill/>
+            <a:ln w="38100">
+              <a:solidFill>
+                <a:schemeClr val="accent6"/>
+              </a:solidFill>
+            </a:ln>
+          </p:spPr>
+          <p:style>
+            <a:lnRef idx="2">
+              <a:schemeClr val="accent1">
+                <a:shade val="15000"/>
+              </a:schemeClr>
+            </a:lnRef>
+            <a:fillRef idx="1">
+              <a:schemeClr val="accent1"/>
+            </a:fillRef>
+            <a:effectRef idx="0">
+              <a:schemeClr val="accent1"/>
+            </a:effectRef>
+            <a:fontRef idx="minor">
+              <a:schemeClr val="lt1"/>
+            </a:fontRef>
+          </p:style>
+          <p:txBody>
+            <a:bodyPr rtlCol="0" anchor="ctr"/>
+            <a:lstStyle/>
+            <a:p>
+              <a:pPr algn="ctr"/>
+              <a:endParaRPr lang="en-US"/>
+            </a:p>
+          </p:txBody>
+        </p:sp>
+        <p:cxnSp>
+          <p:nvCxnSpPr>
+            <p:cNvPr id="3" name="Straight Arrow Connector 2">
+              <a:extLst>
+                <a:ext uri="{FF2B5EF4-FFF2-40B4-BE49-F238E27FC236}">
+                  <a16:creationId xmlns:a16="http://schemas.microsoft.com/office/drawing/2014/main" id="{1BF9F43B-624A-F81F-B77C-E499EB67AB51}"/>
+                </a:ext>
+              </a:extLst>
+            </p:cNvPr>
+            <p:cNvCxnSpPr>
+              <a:cxnSpLocks/>
+            </p:cNvCxnSpPr>
+            <p:nvPr/>
+          </p:nvCxnSpPr>
+          <p:spPr>
+            <a:xfrm>
+              <a:off x="6190488" y="1746505"/>
+              <a:ext cx="323090" cy="0"/>
+            </a:xfrm>
+            <a:prstGeom prst="straightConnector1">
+              <a:avLst/>
+            </a:prstGeom>
+            <a:ln w="38100">
+              <a:solidFill>
+                <a:schemeClr val="accent6"/>
+              </a:solidFill>
+              <a:tailEnd type="triangle"/>
+            </a:ln>
+          </p:spPr>
+          <p:style>
+            <a:lnRef idx="2">
+              <a:schemeClr val="accent1"/>
+            </a:lnRef>
+            <a:fillRef idx="0">
+              <a:schemeClr val="accent1"/>
+            </a:fillRef>
+            <a:effectRef idx="1">
+              <a:schemeClr val="accent1"/>
+            </a:effectRef>
+            <a:fontRef idx="minor">
+              <a:schemeClr val="tx1"/>
+            </a:fontRef>
+          </p:style>
+        </p:cxnSp>
+        <p:sp>
+          <p:nvSpPr>
+            <p:cNvPr id="4" name="Rectangle 3">
+              <a:extLst>
+                <a:ext uri="{FF2B5EF4-FFF2-40B4-BE49-F238E27FC236}">
+                  <a16:creationId xmlns:a16="http://schemas.microsoft.com/office/drawing/2014/main" id="{A7A8B5B3-91F5-9D47-B5EB-3E4BAB14716C}"/>
+                </a:ext>
+              </a:extLst>
+            </p:cNvPr>
+            <p:cNvSpPr/>
+            <p:nvPr/>
+          </p:nvSpPr>
+          <p:spPr>
+            <a:xfrm>
+              <a:off x="6667118" y="3158528"/>
+              <a:ext cx="5439537" cy="3452584"/>
+            </a:xfrm>
+            <a:prstGeom prst="rect">
+              <a:avLst/>
+            </a:prstGeom>
+            <a:noFill/>
+            <a:ln w="38100">
+              <a:solidFill>
+                <a:schemeClr val="accent6"/>
+              </a:solidFill>
+            </a:ln>
+          </p:spPr>
+          <p:style>
+            <a:lnRef idx="2">
+              <a:schemeClr val="accent1">
+                <a:shade val="15000"/>
+              </a:schemeClr>
+            </a:lnRef>
+            <a:fillRef idx="1">
+              <a:schemeClr val="accent1"/>
+            </a:fillRef>
+            <a:effectRef idx="0">
+              <a:schemeClr val="accent1"/>
+            </a:effectRef>
+            <a:fontRef idx="minor">
+              <a:schemeClr val="lt1"/>
+            </a:fontRef>
+          </p:style>
+          <p:txBody>
+            <a:bodyPr rtlCol="0" anchor="ctr"/>
+            <a:lstStyle/>
+            <a:p>
+              <a:pPr algn="ctr"/>
+              <a:endParaRPr lang="en-US"/>
+            </a:p>
+          </p:txBody>
+        </p:sp>
+        <p:sp>
+          <p:nvSpPr>
+            <p:cNvPr id="6" name="Rectangle 5">
+              <a:extLst>
+                <a:ext uri="{FF2B5EF4-FFF2-40B4-BE49-F238E27FC236}">
+                  <a16:creationId xmlns:a16="http://schemas.microsoft.com/office/drawing/2014/main" id="{EA44E6A4-FFED-1642-ABDF-4EC29A04B302}"/>
+                </a:ext>
+              </a:extLst>
+            </p:cNvPr>
+            <p:cNvSpPr/>
+            <p:nvPr/>
+          </p:nvSpPr>
+          <p:spPr>
+            <a:xfrm>
+              <a:off x="7020687" y="2689478"/>
+              <a:ext cx="376810" cy="233555"/>
             </a:xfrm>
             <a:prstGeom prst="rect">
               <a:avLst/>
@@ -4822,7 +5229,7 @@
             <p:cNvPr id="7" name="Straight Arrow Connector 6">
               <a:extLst>
                 <a:ext uri="{FF2B5EF4-FFF2-40B4-BE49-F238E27FC236}">
-                  <a16:creationId xmlns:a16="http://schemas.microsoft.com/office/drawing/2014/main" id="{9BD6B891-37D1-CE1D-2DA4-6695FB006732}"/>
+                  <a16:creationId xmlns:a16="http://schemas.microsoft.com/office/drawing/2014/main" id="{ADEF98C9-7FD0-E4BF-A30B-28E0F4CA06F0}"/>
                 </a:ext>
               </a:extLst>
             </p:cNvPr>
@@ -4832,9 +5239,9 @@
             <p:nvPr/>
           </p:nvCxnSpPr>
           <p:spPr>
-            <a:xfrm flipH="1">
-              <a:off x="4331589" y="1930527"/>
-              <a:ext cx="314325" cy="0"/>
+            <a:xfrm>
+              <a:off x="7208690" y="2304245"/>
+              <a:ext cx="0" cy="292608"/>
             </a:xfrm>
             <a:prstGeom prst="straightConnector1">
               <a:avLst/>
@@ -4863,10 +5270,10 @@
         </p:cxnSp>
         <p:sp>
           <p:nvSpPr>
-            <p:cNvPr id="9" name="Rectangle 8">
+            <p:cNvPr id="11" name="Rectangle 10">
               <a:extLst>
                 <a:ext uri="{FF2B5EF4-FFF2-40B4-BE49-F238E27FC236}">
-                  <a16:creationId xmlns:a16="http://schemas.microsoft.com/office/drawing/2014/main" id="{AE6D4133-2FC6-D1AE-3E67-EECCFD5BBC2B}"/>
+                  <a16:creationId xmlns:a16="http://schemas.microsoft.com/office/drawing/2014/main" id="{7674E2B3-060C-DA86-47FC-18B08C881552}"/>
                 </a:ext>
               </a:extLst>
             </p:cNvPr>
@@ -4875,8 +5282,8 @@
           </p:nvSpPr>
           <p:spPr>
             <a:xfrm>
-              <a:off x="6273165" y="1032128"/>
-              <a:ext cx="327660" cy="187452"/>
+              <a:off x="4748785" y="2511510"/>
+              <a:ext cx="152398" cy="233555"/>
             </a:xfrm>
             <a:prstGeom prst="rect">
               <a:avLst/>
@@ -4915,10 +5322,10 @@
         </p:sp>
         <p:cxnSp>
           <p:nvCxnSpPr>
-            <p:cNvPr id="10" name="Straight Arrow Connector 9">
+            <p:cNvPr id="13" name="Straight Arrow Connector 12">
               <a:extLst>
                 <a:ext uri="{FF2B5EF4-FFF2-40B4-BE49-F238E27FC236}">
-                  <a16:creationId xmlns:a16="http://schemas.microsoft.com/office/drawing/2014/main" id="{07843FEC-1A38-A4B6-1397-2BEA74B3359E}"/>
+                  <a16:creationId xmlns:a16="http://schemas.microsoft.com/office/drawing/2014/main" id="{16E42C07-BBF3-F907-C4E9-18050C6B965D}"/>
                 </a:ext>
               </a:extLst>
             </p:cNvPr>
@@ -4928,9 +5335,9 @@
             <p:nvPr/>
           </p:nvCxnSpPr>
           <p:spPr>
-            <a:xfrm>
-              <a:off x="6431450" y="685757"/>
-              <a:ext cx="0" cy="292608"/>
+            <a:xfrm flipV="1">
+              <a:off x="4818887" y="2130553"/>
+              <a:ext cx="0" cy="283420"/>
             </a:xfrm>
             <a:prstGeom prst="straightConnector1">
               <a:avLst/>
@@ -4957,11 +5364,60 @@
             </a:fontRef>
           </p:style>
         </p:cxnSp>
+        <p:sp>
+          <p:nvSpPr>
+            <p:cNvPr id="15" name="TextBox 14">
+              <a:extLst>
+                <a:ext uri="{FF2B5EF4-FFF2-40B4-BE49-F238E27FC236}">
+                  <a16:creationId xmlns:a16="http://schemas.microsoft.com/office/drawing/2014/main" id="{513820EB-73BE-24C1-B312-5D1E4487C39C}"/>
+                </a:ext>
+              </a:extLst>
+            </p:cNvPr>
+            <p:cNvSpPr txBox="1"/>
+            <p:nvPr/>
+          </p:nvSpPr>
+          <p:spPr>
+            <a:xfrm>
+              <a:off x="3877056" y="1591056"/>
+              <a:ext cx="1627632" cy="523220"/>
+            </a:xfrm>
+            <a:prstGeom prst="rect">
+              <a:avLst/>
+            </a:prstGeom>
+            <a:noFill/>
+            <a:ln>
+              <a:solidFill>
+                <a:srgbClr val="E31A1C"/>
+              </a:solidFill>
+            </a:ln>
+          </p:spPr>
+          <p:txBody>
+            <a:bodyPr wrap="square" rtlCol="0">
+              <a:spAutoFit/>
+            </a:bodyPr>
+            <a:lstStyle/>
+            <a:p>
+              <a:r>
+                <a:rPr lang="pt-BR" sz="1400" dirty="0">
+                  <a:solidFill>
+                    <a:schemeClr val="bg1"/>
+                  </a:solidFill>
+                </a:rPr>
+                <a:t>Seu cursor deve estar neste painel</a:t>
+              </a:r>
+              <a:endParaRPr lang="en-US" sz="1400" dirty="0">
+                <a:solidFill>
+                  <a:schemeClr val="bg1"/>
+                </a:solidFill>
+              </a:endParaRPr>
+            </a:p>
+          </p:txBody>
+        </p:sp>
       </p:grpSp>
     </p:spTree>
     <p:extLst>
       <p:ext uri="{BB962C8B-B14F-4D97-AF65-F5344CB8AC3E}">
-        <p14:creationId xmlns:p14="http://schemas.microsoft.com/office/powerpoint/2010/main" val="2803301930"/>
+        <p14:creationId xmlns:p14="http://schemas.microsoft.com/office/powerpoint/2010/main" val="966754592"/>
       </p:ext>
     </p:extLst>
   </p:cSld>

</xml_diff>